<commit_message>
Ajout de cas de test
</commit_message>
<xml_diff>
--- a/docs/Projet 7 - C. Muths - Classification d'images.pptx
+++ b/docs/Projet 7 - C. Muths - Classification d'images.pptx
@@ -5,7 +5,7 @@
     <p:sldMasterId id="2147483648" r:id="rId4"/>
   </p:sldMasterIdLst>
   <p:notesMasterIdLst>
-    <p:notesMasterId r:id="rId27"/>
+    <p:notesMasterId r:id="rId25"/>
   </p:notesMasterIdLst>
   <p:sldIdLst>
     <p:sldId id="365" r:id="rId5"/>
@@ -13,23 +13,21 @@
     <p:sldId id="381" r:id="rId7"/>
     <p:sldId id="385" r:id="rId8"/>
     <p:sldId id="400" r:id="rId9"/>
-    <p:sldId id="402" r:id="rId10"/>
-    <p:sldId id="401" r:id="rId11"/>
-    <p:sldId id="403" r:id="rId12"/>
-    <p:sldId id="404" r:id="rId13"/>
-    <p:sldId id="405" r:id="rId14"/>
-    <p:sldId id="406" r:id="rId15"/>
-    <p:sldId id="407" r:id="rId16"/>
-    <p:sldId id="408" r:id="rId17"/>
-    <p:sldId id="409" r:id="rId18"/>
-    <p:sldId id="411" r:id="rId19"/>
-    <p:sldId id="412" r:id="rId20"/>
-    <p:sldId id="413" r:id="rId21"/>
-    <p:sldId id="415" r:id="rId22"/>
-    <p:sldId id="410" r:id="rId23"/>
-    <p:sldId id="414" r:id="rId24"/>
-    <p:sldId id="399" r:id="rId25"/>
-    <p:sldId id="287" r:id="rId26"/>
+    <p:sldId id="401" r:id="rId10"/>
+    <p:sldId id="404" r:id="rId11"/>
+    <p:sldId id="405" r:id="rId12"/>
+    <p:sldId id="406" r:id="rId13"/>
+    <p:sldId id="407" r:id="rId14"/>
+    <p:sldId id="408" r:id="rId15"/>
+    <p:sldId id="409" r:id="rId16"/>
+    <p:sldId id="411" r:id="rId17"/>
+    <p:sldId id="412" r:id="rId18"/>
+    <p:sldId id="413" r:id="rId19"/>
+    <p:sldId id="415" r:id="rId20"/>
+    <p:sldId id="410" r:id="rId21"/>
+    <p:sldId id="414" r:id="rId22"/>
+    <p:sldId id="399" r:id="rId23"/>
+    <p:sldId id="287" r:id="rId24"/>
   </p:sldIdLst>
   <p:sldSz cx="11887200" cy="6858000"/>
   <p:notesSz cx="9931400" cy="14351000"/>
@@ -3951,7 +3949,15 @@
           <a:p>
             <a:r>
               <a:rPr lang="en-US" dirty="0"/>
-              <a:t>30 juin2018</a:t>
+              <a:t>11 </a:t>
+            </a:r>
+            <a:r>
+              <a:rPr lang="en-US" dirty="0" err="1"/>
+              <a:t>juillet</a:t>
+            </a:r>
+            <a:r>
+              <a:rPr lang="en-US" dirty="0"/>
+              <a:t> 2018</a:t>
             </a:r>
             <a:endParaRPr lang="en-US" dirty="0">
               <a:solidFill>
@@ -3993,307 +3999,6 @@
 </file>
 
 <file path=ppt/slides/slide10.xml><?xml version="1.0" encoding="utf-8"?>
-<p:sld xmlns:a="http://schemas.openxmlformats.org/drawingml/2006/main" xmlns:r="http://schemas.openxmlformats.org/officeDocument/2006/relationships" xmlns:p="http://schemas.openxmlformats.org/presentationml/2006/main">
-  <p:cSld>
-    <p:spTree>
-      <p:nvGrpSpPr>
-        <p:cNvPr id="1" name=""/>
-        <p:cNvGrpSpPr/>
-        <p:nvPr/>
-      </p:nvGrpSpPr>
-      <p:grpSpPr>
-        <a:xfrm>
-          <a:off x="0" y="0"/>
-          <a:ext cx="0" cy="0"/>
-          <a:chOff x="0" y="0"/>
-          <a:chExt cx="0" cy="0"/>
-        </a:xfrm>
-      </p:grpSpPr>
-      <p:sp>
-        <p:nvSpPr>
-          <p:cNvPr id="2" name="Titre 1">
-            <a:extLst>
-              <a:ext uri="{FF2B5EF4-FFF2-40B4-BE49-F238E27FC236}">
-                <a16:creationId xmlns:a16="http://schemas.microsoft.com/office/drawing/2014/main" id="{36CFCD8D-DD1D-43E6-908F-6A737C1C0A51}"/>
-              </a:ext>
-            </a:extLst>
-          </p:cNvPr>
-          <p:cNvSpPr>
-            <a:spLocks noGrp="1"/>
-          </p:cNvSpPr>
-          <p:nvPr>
-            <p:ph type="title"/>
-          </p:nvPr>
-        </p:nvSpPr>
-        <p:spPr/>
-        <p:txBody>
-          <a:bodyPr/>
-          <a:lstStyle/>
-          <a:p>
-            <a:r>
-              <a:rPr lang="fr-FR" dirty="0"/>
-              <a:t>5. Algorithme SIFT</a:t>
-            </a:r>
-            <a:br>
-              <a:rPr lang="fr-FR" dirty="0"/>
-            </a:br>
-            <a:r>
-              <a:rPr lang="fr-FR" dirty="0"/>
-              <a:t>Distribution des histogrammes</a:t>
-            </a:r>
-          </a:p>
-        </p:txBody>
-      </p:sp>
-      <p:sp>
-        <p:nvSpPr>
-          <p:cNvPr id="3" name="Espace réservé du contenu 2">
-            <a:extLst>
-              <a:ext uri="{FF2B5EF4-FFF2-40B4-BE49-F238E27FC236}">
-                <a16:creationId xmlns:a16="http://schemas.microsoft.com/office/drawing/2014/main" id="{48BDE116-C35A-4DE3-82E3-3B0B01FB21B5}"/>
-              </a:ext>
-            </a:extLst>
-          </p:cNvPr>
-          <p:cNvSpPr>
-            <a:spLocks noGrp="1"/>
-          </p:cNvSpPr>
-          <p:nvPr>
-            <p:ph idx="1"/>
-          </p:nvPr>
-        </p:nvSpPr>
-        <p:spPr/>
-        <p:txBody>
-          <a:bodyPr/>
-          <a:lstStyle/>
-          <a:p>
-            <a:r>
-              <a:rPr lang="fr-FR" dirty="0"/>
-              <a:t>Représentation t-SNE des histogrammes de 3 races de chiens (300 images)</a:t>
-            </a:r>
-          </a:p>
-          <a:p>
-            <a:endParaRPr lang="fr-FR" dirty="0"/>
-          </a:p>
-          <a:p>
-            <a:endParaRPr lang="fr-FR" dirty="0"/>
-          </a:p>
-        </p:txBody>
-      </p:sp>
-      <p:pic>
-        <p:nvPicPr>
-          <p:cNvPr id="9" name="Image 8">
-            <a:extLst>
-              <a:ext uri="{FF2B5EF4-FFF2-40B4-BE49-F238E27FC236}">
-                <a16:creationId xmlns:a16="http://schemas.microsoft.com/office/drawing/2014/main" id="{A335F372-B6A2-495D-8442-6A0E05430D51}"/>
-              </a:ext>
-            </a:extLst>
-          </p:cNvPr>
-          <p:cNvPicPr>
-            <a:picLocks noChangeAspect="1"/>
-          </p:cNvPicPr>
-          <p:nvPr/>
-        </p:nvPicPr>
-        <p:blipFill>
-          <a:blip r:embed="rId2">
-            <a:extLst>
-              <a:ext uri="{28A0092B-C50C-407E-A947-70E740481C1C}">
-                <a14:useLocalDpi xmlns:a14="http://schemas.microsoft.com/office/drawing/2010/main" val="0"/>
-              </a:ext>
-            </a:extLst>
-          </a:blip>
-          <a:stretch>
-            <a:fillRect/>
-          </a:stretch>
-        </p:blipFill>
-        <p:spPr>
-          <a:xfrm>
-            <a:off x="3763078" y="1840331"/>
-            <a:ext cx="4361044" cy="4295954"/>
-          </a:xfrm>
-          <a:prstGeom prst="rect">
-            <a:avLst/>
-          </a:prstGeom>
-        </p:spPr>
-      </p:pic>
-    </p:spTree>
-    <p:extLst>
-      <p:ext uri="{BB962C8B-B14F-4D97-AF65-F5344CB8AC3E}">
-        <p14:creationId xmlns:p14="http://schemas.microsoft.com/office/powerpoint/2010/main" val="2572900103"/>
-      </p:ext>
-    </p:extLst>
-  </p:cSld>
-  <p:clrMapOvr>
-    <a:masterClrMapping/>
-  </p:clrMapOvr>
-</p:sld>
-</file>
-
-<file path=ppt/slides/slide11.xml><?xml version="1.0" encoding="utf-8"?>
-<p:sld xmlns:a="http://schemas.openxmlformats.org/drawingml/2006/main" xmlns:r="http://schemas.openxmlformats.org/officeDocument/2006/relationships" xmlns:p="http://schemas.openxmlformats.org/presentationml/2006/main">
-  <p:cSld>
-    <p:spTree>
-      <p:nvGrpSpPr>
-        <p:cNvPr id="1" name=""/>
-        <p:cNvGrpSpPr/>
-        <p:nvPr/>
-      </p:nvGrpSpPr>
-      <p:grpSpPr>
-        <a:xfrm>
-          <a:off x="0" y="0"/>
-          <a:ext cx="0" cy="0"/>
-          <a:chOff x="0" y="0"/>
-          <a:chExt cx="0" cy="0"/>
-        </a:xfrm>
-      </p:grpSpPr>
-      <p:sp>
-        <p:nvSpPr>
-          <p:cNvPr id="2" name="Titre 1">
-            <a:extLst>
-              <a:ext uri="{FF2B5EF4-FFF2-40B4-BE49-F238E27FC236}">
-                <a16:creationId xmlns:a16="http://schemas.microsoft.com/office/drawing/2014/main" id="{36CFCD8D-DD1D-43E6-908F-6A737C1C0A51}"/>
-              </a:ext>
-            </a:extLst>
-          </p:cNvPr>
-          <p:cNvSpPr>
-            <a:spLocks noGrp="1"/>
-          </p:cNvSpPr>
-          <p:nvPr>
-            <p:ph type="title"/>
-          </p:nvPr>
-        </p:nvSpPr>
-        <p:spPr/>
-        <p:txBody>
-          <a:bodyPr/>
-          <a:lstStyle/>
-          <a:p>
-            <a:r>
-              <a:rPr lang="fr-FR" dirty="0"/>
-              <a:t>5. Algorithme SIFT</a:t>
-            </a:r>
-            <a:br>
-              <a:rPr lang="fr-FR" dirty="0"/>
-            </a:br>
-            <a:r>
-              <a:rPr lang="fr-FR" dirty="0"/>
-              <a:t>Clustering supervisé</a:t>
-            </a:r>
-          </a:p>
-        </p:txBody>
-      </p:sp>
-      <p:sp>
-        <p:nvSpPr>
-          <p:cNvPr id="3" name="Espace réservé du contenu 2">
-            <a:extLst>
-              <a:ext uri="{FF2B5EF4-FFF2-40B4-BE49-F238E27FC236}">
-                <a16:creationId xmlns:a16="http://schemas.microsoft.com/office/drawing/2014/main" id="{48BDE116-C35A-4DE3-82E3-3B0B01FB21B5}"/>
-              </a:ext>
-            </a:extLst>
-          </p:cNvPr>
-          <p:cNvSpPr>
-            <a:spLocks noGrp="1"/>
-          </p:cNvSpPr>
-          <p:nvPr>
-            <p:ph idx="1"/>
-          </p:nvPr>
-        </p:nvSpPr>
-        <p:spPr/>
-        <p:txBody>
-          <a:bodyPr/>
-          <a:lstStyle/>
-          <a:p>
-            <a:r>
-              <a:rPr lang="fr-FR" dirty="0"/>
-              <a:t>Un algorithme de clustering supervisé est entrainé sur les histogrammes de chaque image. Il sert ensuite à classifier les nouvelles images, et l’</a:t>
-            </a:r>
-            <a:r>
-              <a:rPr lang="fr-FR" dirty="0" err="1"/>
-              <a:t>accuracy</a:t>
-            </a:r>
-            <a:r>
-              <a:rPr lang="fr-FR" dirty="0"/>
-              <a:t> score est calculé.</a:t>
-            </a:r>
-          </a:p>
-          <a:p>
-            <a:pPr lvl="1"/>
-            <a:r>
-              <a:rPr lang="fr-FR" dirty="0"/>
-              <a:t>Dans un premier temps </a:t>
-            </a:r>
-            <a:r>
-              <a:rPr lang="fr-FR" dirty="0" err="1"/>
-              <a:t>sklearn.linear_model.RidgeClassifier</a:t>
-            </a:r>
-            <a:r>
-              <a:rPr lang="fr-FR" dirty="0"/>
-              <a:t> est utilisé.</a:t>
-            </a:r>
-          </a:p>
-          <a:p>
-            <a:r>
-              <a:rPr lang="fr-FR" dirty="0"/>
-              <a:t>Résultats typiques obtenus :</a:t>
-            </a:r>
-          </a:p>
-          <a:p>
-            <a:pPr lvl="1"/>
-            <a:r>
-              <a:rPr lang="fr-FR" dirty="0"/>
-              <a:t>2 races : 40 à 95% (détails en slide suivant)</a:t>
-            </a:r>
-          </a:p>
-          <a:p>
-            <a:pPr lvl="1"/>
-            <a:r>
-              <a:rPr lang="fr-FR" dirty="0"/>
-              <a:t>10 races : 26%</a:t>
-            </a:r>
-          </a:p>
-          <a:p>
-            <a:pPr lvl="1"/>
-            <a:r>
-              <a:rPr lang="fr-FR" dirty="0"/>
-              <a:t>30 races : 15%</a:t>
-            </a:r>
-          </a:p>
-          <a:p>
-            <a:pPr lvl="1"/>
-            <a:r>
-              <a:rPr lang="fr-FR" dirty="0"/>
-              <a:t>50 races : 10%</a:t>
-            </a:r>
-          </a:p>
-          <a:p>
-            <a:pPr lvl="1"/>
-            <a:endParaRPr lang="fr-FR" dirty="0"/>
-          </a:p>
-          <a:p>
-            <a:endParaRPr lang="fr-FR" dirty="0"/>
-          </a:p>
-          <a:p>
-            <a:endParaRPr lang="fr-FR" dirty="0"/>
-          </a:p>
-          <a:p>
-            <a:endParaRPr lang="fr-FR" dirty="0"/>
-          </a:p>
-          <a:p>
-            <a:endParaRPr lang="fr-FR" dirty="0"/>
-          </a:p>
-        </p:txBody>
-      </p:sp>
-    </p:spTree>
-    <p:extLst>
-      <p:ext uri="{BB962C8B-B14F-4D97-AF65-F5344CB8AC3E}">
-        <p14:creationId xmlns:p14="http://schemas.microsoft.com/office/powerpoint/2010/main" val="1250577055"/>
-      </p:ext>
-    </p:extLst>
-  </p:cSld>
-  <p:clrMapOvr>
-    <a:masterClrMapping/>
-  </p:clrMapOvr>
-</p:sld>
-</file>
-
-<file path=ppt/slides/slide12.xml><?xml version="1.0" encoding="utf-8"?>
 <p:sld xmlns:a="http://schemas.openxmlformats.org/drawingml/2006/main" xmlns:r="http://schemas.openxmlformats.org/officeDocument/2006/relationships" xmlns:p="http://schemas.openxmlformats.org/presentationml/2006/main">
   <p:cSld>
     <p:spTree>
@@ -4734,7 +4439,7 @@
 </p:sld>
 </file>
 
-<file path=ppt/slides/slide13.xml><?xml version="1.0" encoding="utf-8"?>
+<file path=ppt/slides/slide11.xml><?xml version="1.0" encoding="utf-8"?>
 <p:sld xmlns:a="http://schemas.openxmlformats.org/drawingml/2006/main" xmlns:r="http://schemas.openxmlformats.org/officeDocument/2006/relationships" xmlns:p="http://schemas.openxmlformats.org/presentationml/2006/main">
   <p:cSld>
     <p:spTree>
@@ -5135,7 +4840,7 @@
 </p:sld>
 </file>
 
-<file path=ppt/slides/slide14.xml><?xml version="1.0" encoding="utf-8"?>
+<file path=ppt/slides/slide12.xml><?xml version="1.0" encoding="utf-8"?>
 <p:sld xmlns:a="http://schemas.openxmlformats.org/drawingml/2006/main" xmlns:r="http://schemas.openxmlformats.org/officeDocument/2006/relationships" xmlns:p="http://schemas.openxmlformats.org/presentationml/2006/main">
   <p:cSld>
     <p:spTree>
@@ -5214,6 +4919,13 @@
             </a:r>
           </a:p>
           <a:p>
+            <a:pPr lvl="1"/>
+            <a:r>
+              <a:rPr lang="fr-FR" dirty="0"/>
+              <a:t>Plusieurs versions d’images ont été utilisées</a:t>
+            </a:r>
+          </a:p>
+          <a:p>
             <a:r>
               <a:rPr lang="fr-FR" dirty="0"/>
               <a:t>Nombre de clusters K-</a:t>
@@ -5249,15 +4961,6 @@
               <a:rPr lang="fr-FR" dirty="0"/>
               <a:t>La variation de la performance en fonction du nombre de clusters est faible.</a:t>
             </a:r>
-          </a:p>
-          <a:p>
-            <a:r>
-              <a:rPr lang="fr-FR" dirty="0"/>
-              <a:t>Algorithme de clustering supervisé</a:t>
-            </a:r>
-          </a:p>
-          <a:p>
-            <a:endParaRPr lang="fr-FR" dirty="0"/>
           </a:p>
           <a:p>
             <a:endParaRPr lang="fr-FR" dirty="0"/>
@@ -5298,7 +5001,7 @@
 </p:sld>
 </file>
 
-<file path=ppt/slides/slide15.xml><?xml version="1.0" encoding="utf-8"?>
+<file path=ppt/slides/slide13.xml><?xml version="1.0" encoding="utf-8"?>
 <p:sld xmlns:a="http://schemas.openxmlformats.org/drawingml/2006/main" xmlns:r="http://schemas.openxmlformats.org/officeDocument/2006/relationships" xmlns:p="http://schemas.openxmlformats.org/presentationml/2006/main">
   <p:cSld>
     <p:spTree>
@@ -5536,7 +5239,7 @@
 </p:sld>
 </file>
 
-<file path=ppt/slides/slide16.xml><?xml version="1.0" encoding="utf-8"?>
+<file path=ppt/slides/slide14.xml><?xml version="1.0" encoding="utf-8"?>
 <p:sld xmlns:a="http://schemas.openxmlformats.org/drawingml/2006/main" xmlns:r="http://schemas.openxmlformats.org/officeDocument/2006/relationships" xmlns:p="http://schemas.openxmlformats.org/presentationml/2006/main">
   <p:cSld>
     <p:spTree>
@@ -5622,7 +5325,7 @@
           <a:p>
             <a:r>
               <a:rPr lang="fr-FR" dirty="0"/>
-              <a:t>Entraîner un nouveau réseau de neurones nécessite un forte puissance de calcul et beaucoup de temps. Il existe des réseaux pré-entrainés qui peuvent être adaptés à la tâche à réaliser : le Transfer Learning.</a:t>
+              <a:t>Entraîner un nouveau réseau de neurones nécessite une forte puissance de calcul et beaucoup de temps. Il existe des réseaux pré-entrainés qui peuvent être adaptés à la tâche à réaliser : le Transfer Learning.</a:t>
             </a:r>
           </a:p>
           <a:p>
@@ -5637,21 +5340,32 @@
             </a:r>
             <a:r>
               <a:rPr lang="fr-FR" dirty="0"/>
-              <a:t> qui ne portent </a:t>
+              <a:t> qui ne portent pas de paramètre).</a:t>
+            </a:r>
+          </a:p>
+          <a:p>
+            <a:r>
+              <a:rPr lang="fr-FR" dirty="0"/>
+              <a:t>Trois stratégies de Transfer Learning ont été mises en œuvre</a:t>
+            </a:r>
+          </a:p>
+          <a:p>
+            <a:pPr lvl="1"/>
+            <a:r>
+              <a:rPr lang="fr-FR" dirty="0"/>
+              <a:t>Extraction des </a:t>
             </a:r>
             <a:r>
               <a:rPr lang="fr-FR" dirty="0" err="1"/>
-              <a:t>âs</a:t>
-            </a:r>
-            <a:r>
-              <a:rPr lang="fr-FR" dirty="0"/>
-              <a:t> de paramètre).</a:t>
-            </a:r>
-          </a:p>
-          <a:p>
-            <a:r>
-              <a:rPr lang="fr-FR" dirty="0"/>
-              <a:t>Trois stratégies de Transfer Learning ont été mises en œuvre</a:t>
+              <a:t>features</a:t>
+            </a:r>
+            <a:endParaRPr lang="fr-FR" dirty="0"/>
+          </a:p>
+          <a:p>
+            <a:pPr lvl="1"/>
+            <a:r>
+              <a:rPr lang="fr-FR" dirty="0"/>
+              <a:t>Fine tuning partiel</a:t>
             </a:r>
           </a:p>
           <a:p>
@@ -5668,25 +5382,6 @@
               <a:rPr lang="fr-FR" dirty="0"/>
               <a:t> total</a:t>
             </a:r>
-          </a:p>
-          <a:p>
-            <a:pPr lvl="1"/>
-            <a:r>
-              <a:rPr lang="fr-FR" dirty="0"/>
-              <a:t>Fine tuning partiel</a:t>
-            </a:r>
-          </a:p>
-          <a:p>
-            <a:pPr lvl="1"/>
-            <a:r>
-              <a:rPr lang="fr-FR" dirty="0"/>
-              <a:t>Extraction des </a:t>
-            </a:r>
-            <a:r>
-              <a:rPr lang="fr-FR" dirty="0" err="1"/>
-              <a:t>features</a:t>
-            </a:r>
-            <a:endParaRPr lang="fr-FR" dirty="0"/>
           </a:p>
         </p:txBody>
       </p:sp>
@@ -5703,7 +5398,7 @@
 </p:sld>
 </file>
 
-<file path=ppt/slides/slide17.xml><?xml version="1.0" encoding="utf-8"?>
+<file path=ppt/slides/slide15.xml><?xml version="1.0" encoding="utf-8"?>
 <p:sld xmlns:a="http://schemas.openxmlformats.org/drawingml/2006/main" xmlns:r="http://schemas.openxmlformats.org/officeDocument/2006/relationships" xmlns:p="http://schemas.openxmlformats.org/presentationml/2006/main">
   <p:cSld>
     <p:spTree>
@@ -5800,7 +5495,7 @@
 </p:sld>
 </file>
 
-<file path=ppt/slides/slide18.xml><?xml version="1.0" encoding="utf-8"?>
+<file path=ppt/slides/slide16.xml><?xml version="1.0" encoding="utf-8"?>
 <p:sld xmlns:a="http://schemas.openxmlformats.org/drawingml/2006/main" xmlns:r="http://schemas.openxmlformats.org/officeDocument/2006/relationships" xmlns:p="http://schemas.openxmlformats.org/presentationml/2006/main">
   <p:cSld>
     <p:spTree>
@@ -5871,12 +5566,864 @@
           </p:cNvGraphicFramePr>
           <p:nvPr>
             <p:ph idx="1"/>
-            <p:extLst/>
+            <p:extLst>
+              <p:ext uri="{D42A27DB-BD31-4B8C-83A1-F6EECF244321}">
+                <p14:modId xmlns:p14="http://schemas.microsoft.com/office/powerpoint/2010/main" val="1428054400"/>
+              </p:ext>
+            </p:extLst>
           </p:nvPr>
         </p:nvGraphicFramePr>
         <p:xfrm>
           <a:off x="297656" y="1520337"/>
-          <a:ext cx="11291888" cy="2595880"/>
+          <a:ext cx="11291890" cy="2865120"/>
+        </p:xfrm>
+        <a:graphic>
+          <a:graphicData uri="http://schemas.openxmlformats.org/drawingml/2006/table">
+            <a:tbl>
+              <a:tblPr firstRow="1" bandRow="1">
+                <a:tableStyleId>{5C22544A-7EE6-4342-B048-85BDC9FD1C3A}</a:tableStyleId>
+              </a:tblPr>
+              <a:tblGrid>
+                <a:gridCol w="2258378">
+                  <a:extLst>
+                    <a:ext uri="{9D8B030D-6E8A-4147-A177-3AD203B41FA5}">
+                      <a16:colId xmlns:a16="http://schemas.microsoft.com/office/drawing/2014/main" val="2271525431"/>
+                    </a:ext>
+                  </a:extLst>
+                </a:gridCol>
+                <a:gridCol w="1808932">
+                  <a:extLst>
+                    <a:ext uri="{9D8B030D-6E8A-4147-A177-3AD203B41FA5}">
+                      <a16:colId xmlns:a16="http://schemas.microsoft.com/office/drawing/2014/main" val="1813573895"/>
+                    </a:ext>
+                  </a:extLst>
+                </a:gridCol>
+                <a:gridCol w="1708030">
+                  <a:extLst>
+                    <a:ext uri="{9D8B030D-6E8A-4147-A177-3AD203B41FA5}">
+                      <a16:colId xmlns:a16="http://schemas.microsoft.com/office/drawing/2014/main" val="3279943356"/>
+                    </a:ext>
+                  </a:extLst>
+                </a:gridCol>
+                <a:gridCol w="3258172">
+                  <a:extLst>
+                    <a:ext uri="{9D8B030D-6E8A-4147-A177-3AD203B41FA5}">
+                      <a16:colId xmlns:a16="http://schemas.microsoft.com/office/drawing/2014/main" val="1719126174"/>
+                    </a:ext>
+                  </a:extLst>
+                </a:gridCol>
+                <a:gridCol w="2258378">
+                  <a:extLst>
+                    <a:ext uri="{9D8B030D-6E8A-4147-A177-3AD203B41FA5}">
+                      <a16:colId xmlns:a16="http://schemas.microsoft.com/office/drawing/2014/main" val="1033469761"/>
+                    </a:ext>
+                  </a:extLst>
+                </a:gridCol>
+              </a:tblGrid>
+              <a:tr h="370840">
+                <a:tc>
+                  <a:txBody>
+                    <a:bodyPr/>
+                    <a:lstStyle/>
+                    <a:p>
+                      <a:r>
+                        <a:rPr lang="fr-FR" dirty="0" err="1"/>
+                        <a:t>Strategy</a:t>
+                      </a:r>
+                      <a:r>
+                        <a:rPr lang="fr-FR" dirty="0"/>
+                        <a:t>:</a:t>
+                      </a:r>
+                    </a:p>
+                  </a:txBody>
+                  <a:tcPr/>
+                </a:tc>
+                <a:tc>
+                  <a:txBody>
+                    <a:bodyPr/>
+                    <a:lstStyle/>
+                    <a:p>
+                      <a:r>
+                        <a:rPr lang="fr-FR" dirty="0"/>
+                        <a:t>Extraction de </a:t>
+                      </a:r>
+                      <a:r>
+                        <a:rPr lang="fr-FR" dirty="0" err="1"/>
+                        <a:t>features</a:t>
+                      </a:r>
+                      <a:endParaRPr lang="fr-FR" dirty="0"/>
+                    </a:p>
+                  </a:txBody>
+                  <a:tcPr/>
+                </a:tc>
+                <a:tc>
+                  <a:txBody>
+                    <a:bodyPr/>
+                    <a:lstStyle/>
+                    <a:p>
+                      <a:r>
+                        <a:rPr lang="fr-FR" dirty="0"/>
+                        <a:t>Fine tuning partiel</a:t>
+                      </a:r>
+                    </a:p>
+                  </a:txBody>
+                  <a:tcPr/>
+                </a:tc>
+                <a:tc>
+                  <a:txBody>
+                    <a:bodyPr/>
+                    <a:lstStyle/>
+                    <a:p>
+                      <a:r>
+                        <a:rPr lang="fr-FR" dirty="0"/>
+                        <a:t>Fine tuning total</a:t>
+                      </a:r>
+                    </a:p>
+                  </a:txBody>
+                  <a:tcPr/>
+                </a:tc>
+                <a:tc>
+                  <a:txBody>
+                    <a:bodyPr/>
+                    <a:lstStyle/>
+                    <a:p>
+                      <a:r>
+                        <a:rPr lang="fr-FR" b="0" i="1" dirty="0"/>
+                        <a:t>Comparaison avec SIFT</a:t>
+                      </a:r>
+                    </a:p>
+                  </a:txBody>
+                  <a:tcPr/>
+                </a:tc>
+                <a:extLst>
+                  <a:ext uri="{0D108BD9-81ED-4DB2-BD59-A6C34878D82A}">
+                    <a16:rowId xmlns:a16="http://schemas.microsoft.com/office/drawing/2014/main" val="633089155"/>
+                  </a:ext>
+                </a:extLst>
+              </a:tr>
+              <a:tr h="370840">
+                <a:tc>
+                  <a:txBody>
+                    <a:bodyPr/>
+                    <a:lstStyle/>
+                    <a:p>
+                      <a:r>
+                        <a:rPr lang="fr-FR" dirty="0"/>
+                        <a:t>2 races, 10 </a:t>
+                      </a:r>
+                      <a:r>
+                        <a:rPr lang="fr-FR" dirty="0" err="1"/>
+                        <a:t>epochs</a:t>
+                      </a:r>
+                      <a:endParaRPr lang="fr-FR" dirty="0"/>
+                    </a:p>
+                  </a:txBody>
+                  <a:tcPr/>
+                </a:tc>
+                <a:tc>
+                  <a:txBody>
+                    <a:bodyPr/>
+                    <a:lstStyle/>
+                    <a:p>
+                      <a:r>
+                        <a:rPr lang="fr-FR" dirty="0"/>
+                        <a:t>89,8%</a:t>
+                      </a:r>
+                    </a:p>
+                  </a:txBody>
+                  <a:tcPr/>
+                </a:tc>
+                <a:tc>
+                  <a:txBody>
+                    <a:bodyPr/>
+                    <a:lstStyle/>
+                    <a:p>
+                      <a:r>
+                        <a:rPr lang="fr-FR" dirty="0"/>
+                        <a:t>89,8%</a:t>
+                      </a:r>
+                    </a:p>
+                  </a:txBody>
+                  <a:tcPr/>
+                </a:tc>
+                <a:tc>
+                  <a:txBody>
+                    <a:bodyPr/>
+                    <a:lstStyle/>
+                    <a:p>
+                      <a:r>
+                        <a:rPr lang="fr-FR" dirty="0"/>
+                        <a:t>91,2%</a:t>
+                      </a:r>
+                    </a:p>
+                  </a:txBody>
+                  <a:tcPr/>
+                </a:tc>
+                <a:tc>
+                  <a:txBody>
+                    <a:bodyPr/>
+                    <a:lstStyle/>
+                    <a:p>
+                      <a:r>
+                        <a:rPr lang="fr-FR" i="1" dirty="0"/>
+                        <a:t>60%</a:t>
+                      </a:r>
+                    </a:p>
+                  </a:txBody>
+                  <a:tcPr/>
+                </a:tc>
+                <a:extLst>
+                  <a:ext uri="{0D108BD9-81ED-4DB2-BD59-A6C34878D82A}">
+                    <a16:rowId xmlns:a16="http://schemas.microsoft.com/office/drawing/2014/main" val="2964425305"/>
+                  </a:ext>
+                </a:extLst>
+              </a:tr>
+              <a:tr h="370840">
+                <a:tc>
+                  <a:txBody>
+                    <a:bodyPr/>
+                    <a:lstStyle/>
+                    <a:p>
+                      <a:pPr marL="0" marR="0" lvl="0" indent="0" algn="l" defTabSz="914400" rtl="0" eaLnBrk="1" fontAlgn="auto" latinLnBrk="0" hangingPunct="1">
+                        <a:lnSpc>
+                          <a:spcPct val="100000"/>
+                        </a:lnSpc>
+                        <a:spcBef>
+                          <a:spcPts val="0"/>
+                        </a:spcBef>
+                        <a:spcAft>
+                          <a:spcPts val="0"/>
+                        </a:spcAft>
+                        <a:buClrTx/>
+                        <a:buSzTx/>
+                        <a:buFontTx/>
+                        <a:buNone/>
+                        <a:tabLst/>
+                        <a:defRPr/>
+                      </a:pPr>
+                      <a:r>
+                        <a:rPr lang="fr-FR" dirty="0"/>
+                        <a:t>2 races, 15 </a:t>
+                      </a:r>
+                      <a:r>
+                        <a:rPr lang="fr-FR" dirty="0" err="1"/>
+                        <a:t>epochs</a:t>
+                      </a:r>
+                      <a:endParaRPr lang="fr-FR" dirty="0"/>
+                    </a:p>
+                  </a:txBody>
+                  <a:tcPr/>
+                </a:tc>
+                <a:tc>
+                  <a:txBody>
+                    <a:bodyPr/>
+                    <a:lstStyle/>
+                    <a:p>
+                      <a:r>
+                        <a:rPr lang="fr-FR" dirty="0"/>
+                        <a:t>90,5%</a:t>
+                      </a:r>
+                    </a:p>
+                  </a:txBody>
+                  <a:tcPr/>
+                </a:tc>
+                <a:tc>
+                  <a:txBody>
+                    <a:bodyPr/>
+                    <a:lstStyle/>
+                    <a:p>
+                      <a:r>
+                        <a:rPr lang="fr-FR" dirty="0"/>
+                        <a:t>92,0%</a:t>
+                      </a:r>
+                    </a:p>
+                  </a:txBody>
+                  <a:tcPr/>
+                </a:tc>
+                <a:tc>
+                  <a:txBody>
+                    <a:bodyPr/>
+                    <a:lstStyle/>
+                    <a:p>
+                      <a:r>
+                        <a:rPr lang="fr-FR" dirty="0"/>
+                        <a:t>94,2%</a:t>
+                      </a:r>
+                    </a:p>
+                  </a:txBody>
+                  <a:tcPr/>
+                </a:tc>
+                <a:tc>
+                  <a:txBody>
+                    <a:bodyPr/>
+                    <a:lstStyle/>
+                    <a:p>
+                      <a:endParaRPr lang="fr-FR" dirty="0"/>
+                    </a:p>
+                  </a:txBody>
+                  <a:tcPr/>
+                </a:tc>
+                <a:extLst>
+                  <a:ext uri="{0D108BD9-81ED-4DB2-BD59-A6C34878D82A}">
+                    <a16:rowId xmlns:a16="http://schemas.microsoft.com/office/drawing/2014/main" val="1281933322"/>
+                  </a:ext>
+                </a:extLst>
+              </a:tr>
+              <a:tr h="370840">
+                <a:tc>
+                  <a:txBody>
+                    <a:bodyPr/>
+                    <a:lstStyle/>
+                    <a:p>
+                      <a:pPr marL="0" marR="0" lvl="0" indent="0" algn="l" defTabSz="914400" rtl="0" eaLnBrk="1" fontAlgn="auto" latinLnBrk="0" hangingPunct="1">
+                        <a:lnSpc>
+                          <a:spcPct val="100000"/>
+                        </a:lnSpc>
+                        <a:spcBef>
+                          <a:spcPts val="0"/>
+                        </a:spcBef>
+                        <a:spcAft>
+                          <a:spcPts val="0"/>
+                        </a:spcAft>
+                        <a:buClrTx/>
+                        <a:buSzTx/>
+                        <a:buFontTx/>
+                        <a:buNone/>
+                        <a:tabLst/>
+                        <a:defRPr/>
+                      </a:pPr>
+                      <a:r>
+                        <a:rPr lang="fr-FR" dirty="0"/>
+                        <a:t>2 races, 20 </a:t>
+                      </a:r>
+                      <a:r>
+                        <a:rPr lang="fr-FR" dirty="0" err="1"/>
+                        <a:t>epochs</a:t>
+                      </a:r>
+                      <a:endParaRPr lang="fr-FR" dirty="0"/>
+                    </a:p>
+                  </a:txBody>
+                  <a:tcPr/>
+                </a:tc>
+                <a:tc>
+                  <a:txBody>
+                    <a:bodyPr/>
+                    <a:lstStyle/>
+                    <a:p>
+                      <a:r>
+                        <a:rPr lang="fr-FR" dirty="0"/>
+                        <a:t>91,2%</a:t>
+                      </a:r>
+                    </a:p>
+                  </a:txBody>
+                  <a:tcPr/>
+                </a:tc>
+                <a:tc>
+                  <a:txBody>
+                    <a:bodyPr/>
+                    <a:lstStyle/>
+                    <a:p>
+                      <a:r>
+                        <a:rPr lang="fr-FR" dirty="0"/>
+                        <a:t>94,2%</a:t>
+                      </a:r>
+                    </a:p>
+                  </a:txBody>
+                  <a:tcPr/>
+                </a:tc>
+                <a:tc>
+                  <a:txBody>
+                    <a:bodyPr/>
+                    <a:lstStyle/>
+                    <a:p>
+                      <a:r>
+                        <a:rPr lang="fr-FR" dirty="0"/>
+                        <a:t>93,4%</a:t>
+                      </a:r>
+                    </a:p>
+                  </a:txBody>
+                  <a:tcPr/>
+                </a:tc>
+                <a:tc>
+                  <a:txBody>
+                    <a:bodyPr/>
+                    <a:lstStyle/>
+                    <a:p>
+                      <a:endParaRPr lang="fr-FR" dirty="0"/>
+                    </a:p>
+                  </a:txBody>
+                  <a:tcPr/>
+                </a:tc>
+                <a:extLst>
+                  <a:ext uri="{0D108BD9-81ED-4DB2-BD59-A6C34878D82A}">
+                    <a16:rowId xmlns:a16="http://schemas.microsoft.com/office/drawing/2014/main" val="2186525973"/>
+                  </a:ext>
+                </a:extLst>
+              </a:tr>
+              <a:tr h="370840">
+                <a:tc>
+                  <a:txBody>
+                    <a:bodyPr/>
+                    <a:lstStyle/>
+                    <a:p>
+                      <a:r>
+                        <a:rPr lang="fr-FR" dirty="0"/>
+                        <a:t>10 races, 20 </a:t>
+                      </a:r>
+                      <a:r>
+                        <a:rPr lang="fr-FR" dirty="0" err="1"/>
+                        <a:t>epochs</a:t>
+                      </a:r>
+                      <a:endParaRPr lang="fr-FR" dirty="0"/>
+                    </a:p>
+                  </a:txBody>
+                  <a:tcPr/>
+                </a:tc>
+                <a:tc>
+                  <a:txBody>
+                    <a:bodyPr/>
+                    <a:lstStyle/>
+                    <a:p>
+                      <a:endParaRPr lang="fr-FR" dirty="0"/>
+                    </a:p>
+                  </a:txBody>
+                  <a:tcPr/>
+                </a:tc>
+                <a:tc>
+                  <a:txBody>
+                    <a:bodyPr/>
+                    <a:lstStyle/>
+                    <a:p>
+                      <a:endParaRPr lang="fr-FR"/>
+                    </a:p>
+                  </a:txBody>
+                  <a:tcPr/>
+                </a:tc>
+                <a:tc>
+                  <a:txBody>
+                    <a:bodyPr/>
+                    <a:lstStyle/>
+                    <a:p>
+                      <a:r>
+                        <a:rPr lang="fr-FR"/>
+                        <a:t>71,9%</a:t>
+                      </a:r>
+                      <a:endParaRPr lang="fr-FR" dirty="0"/>
+                    </a:p>
+                  </a:txBody>
+                  <a:tcPr/>
+                </a:tc>
+                <a:tc>
+                  <a:txBody>
+                    <a:bodyPr/>
+                    <a:lstStyle/>
+                    <a:p>
+                      <a:r>
+                        <a:rPr lang="fr-FR" i="1" dirty="0"/>
+                        <a:t>26%</a:t>
+                      </a:r>
+                    </a:p>
+                  </a:txBody>
+                  <a:tcPr/>
+                </a:tc>
+                <a:extLst>
+                  <a:ext uri="{0D108BD9-81ED-4DB2-BD59-A6C34878D82A}">
+                    <a16:rowId xmlns:a16="http://schemas.microsoft.com/office/drawing/2014/main" val="1808344148"/>
+                  </a:ext>
+                </a:extLst>
+              </a:tr>
+              <a:tr h="370840">
+                <a:tc>
+                  <a:txBody>
+                    <a:bodyPr/>
+                    <a:lstStyle/>
+                    <a:p>
+                      <a:r>
+                        <a:rPr lang="fr-FR" dirty="0"/>
+                        <a:t>30 races, 20 </a:t>
+                      </a:r>
+                      <a:r>
+                        <a:rPr lang="fr-FR" dirty="0" err="1"/>
+                        <a:t>epochs</a:t>
+                      </a:r>
+                      <a:endParaRPr lang="fr-FR" dirty="0"/>
+                    </a:p>
+                  </a:txBody>
+                  <a:tcPr/>
+                </a:tc>
+                <a:tc>
+                  <a:txBody>
+                    <a:bodyPr/>
+                    <a:lstStyle/>
+                    <a:p>
+                      <a:endParaRPr lang="fr-FR"/>
+                    </a:p>
+                  </a:txBody>
+                  <a:tcPr/>
+                </a:tc>
+                <a:tc>
+                  <a:txBody>
+                    <a:bodyPr/>
+                    <a:lstStyle/>
+                    <a:p>
+                      <a:endParaRPr lang="fr-FR"/>
+                    </a:p>
+                  </a:txBody>
+                  <a:tcPr/>
+                </a:tc>
+                <a:tc>
+                  <a:txBody>
+                    <a:bodyPr/>
+                    <a:lstStyle/>
+                    <a:p>
+                      <a:r>
+                        <a:rPr lang="fr-FR"/>
+                        <a:t>53,8% (fit time 11h)</a:t>
+                      </a:r>
+                      <a:endParaRPr lang="fr-FR" dirty="0"/>
+                    </a:p>
+                  </a:txBody>
+                  <a:tcPr/>
+                </a:tc>
+                <a:tc>
+                  <a:txBody>
+                    <a:bodyPr/>
+                    <a:lstStyle/>
+                    <a:p>
+                      <a:r>
+                        <a:rPr lang="fr-FR" i="1" dirty="0"/>
+                        <a:t>15%</a:t>
+                      </a:r>
+                    </a:p>
+                  </a:txBody>
+                  <a:tcPr/>
+                </a:tc>
+                <a:extLst>
+                  <a:ext uri="{0D108BD9-81ED-4DB2-BD59-A6C34878D82A}">
+                    <a16:rowId xmlns:a16="http://schemas.microsoft.com/office/drawing/2014/main" val="4255103291"/>
+                  </a:ext>
+                </a:extLst>
+              </a:tr>
+              <a:tr h="370840">
+                <a:tc>
+                  <a:txBody>
+                    <a:bodyPr/>
+                    <a:lstStyle/>
+                    <a:p>
+                      <a:r>
+                        <a:rPr lang="fr-FR" dirty="0"/>
+                        <a:t>50 races, 20 </a:t>
+                      </a:r>
+                      <a:r>
+                        <a:rPr lang="fr-FR" dirty="0" err="1"/>
+                        <a:t>epochs</a:t>
+                      </a:r>
+                      <a:endParaRPr lang="fr-FR" dirty="0"/>
+                    </a:p>
+                  </a:txBody>
+                  <a:tcPr/>
+                </a:tc>
+                <a:tc>
+                  <a:txBody>
+                    <a:bodyPr/>
+                    <a:lstStyle/>
+                    <a:p>
+                      <a:endParaRPr lang="fr-FR" dirty="0"/>
+                    </a:p>
+                  </a:txBody>
+                  <a:tcPr/>
+                </a:tc>
+                <a:tc>
+                  <a:txBody>
+                    <a:bodyPr/>
+                    <a:lstStyle/>
+                    <a:p>
+                      <a:endParaRPr lang="fr-FR" dirty="0"/>
+                    </a:p>
+                  </a:txBody>
+                  <a:tcPr/>
+                </a:tc>
+                <a:tc>
+                  <a:txBody>
+                    <a:bodyPr/>
+                    <a:lstStyle/>
+                    <a:p>
+                      <a:r>
+                        <a:rPr lang="fr-FR" dirty="0"/>
+                        <a:t>55,8% (fit time 20h)</a:t>
+                      </a:r>
+                    </a:p>
+                  </a:txBody>
+                  <a:tcPr/>
+                </a:tc>
+                <a:tc>
+                  <a:txBody>
+                    <a:bodyPr/>
+                    <a:lstStyle/>
+                    <a:p>
+                      <a:r>
+                        <a:rPr lang="fr-FR" i="1" dirty="0"/>
+                        <a:t>10%</a:t>
+                      </a:r>
+                    </a:p>
+                  </a:txBody>
+                  <a:tcPr/>
+                </a:tc>
+                <a:extLst>
+                  <a:ext uri="{0D108BD9-81ED-4DB2-BD59-A6C34878D82A}">
+                    <a16:rowId xmlns:a16="http://schemas.microsoft.com/office/drawing/2014/main" val="3320849276"/>
+                  </a:ext>
+                </a:extLst>
+              </a:tr>
+            </a:tbl>
+          </a:graphicData>
+        </a:graphic>
+      </p:graphicFrame>
+      <p:sp>
+        <p:nvSpPr>
+          <p:cNvPr id="3" name="ZoneTexte 2">
+            <a:extLst>
+              <a:ext uri="{FF2B5EF4-FFF2-40B4-BE49-F238E27FC236}">
+                <a16:creationId xmlns:a16="http://schemas.microsoft.com/office/drawing/2014/main" id="{324A0D51-CAFB-4F02-9BDD-56E7C82159F3}"/>
+              </a:ext>
+            </a:extLst>
+          </p:cNvPr>
+          <p:cNvSpPr txBox="1"/>
+          <p:nvPr/>
+        </p:nvSpPr>
+        <p:spPr>
+          <a:xfrm>
+            <a:off x="306894" y="4890746"/>
+            <a:ext cx="11282652" cy="1061829"/>
+          </a:xfrm>
+          <a:prstGeom prst="rect">
+            <a:avLst/>
+          </a:prstGeom>
+          <a:noFill/>
+        </p:spPr>
+        <p:txBody>
+          <a:bodyPr wrap="square" rtlCol="0">
+            <a:spAutoFit/>
+          </a:bodyPr>
+          <a:lstStyle/>
+          <a:p>
+            <a:r>
+              <a:rPr lang="fr-FR" dirty="0"/>
+              <a:t>Une </a:t>
+            </a:r>
+            <a:r>
+              <a:rPr lang="fr-FR" dirty="0" err="1"/>
+              <a:t>epoch</a:t>
+            </a:r>
+            <a:r>
+              <a:rPr lang="fr-FR" dirty="0"/>
+              <a:t> est une itération complète sur l’ensemble des valeurs X et Y du jeu d’entraînement.</a:t>
+            </a:r>
+          </a:p>
+          <a:p>
+            <a:r>
+              <a:rPr lang="fr-FR" dirty="0"/>
+              <a:t>La légère dégradation de l’</a:t>
+            </a:r>
+            <a:r>
+              <a:rPr lang="fr-FR" dirty="0" err="1"/>
+              <a:t>accuracy</a:t>
+            </a:r>
+            <a:r>
+              <a:rPr lang="fr-FR" dirty="0"/>
+              <a:t> dans le cas de 20 </a:t>
+            </a:r>
+            <a:r>
+              <a:rPr lang="fr-FR" dirty="0" err="1"/>
+              <a:t>epochs</a:t>
+            </a:r>
+            <a:r>
+              <a:rPr lang="fr-FR" dirty="0"/>
+              <a:t> et le fine tuning total peut faire penser à une situation d’over-</a:t>
+            </a:r>
+            <a:r>
+              <a:rPr lang="fr-FR" dirty="0" err="1"/>
+              <a:t>fitting</a:t>
+            </a:r>
+            <a:r>
+              <a:rPr lang="fr-FR" dirty="0"/>
+              <a:t>.</a:t>
+            </a:r>
+          </a:p>
+        </p:txBody>
+      </p:sp>
+      <p:sp>
+        <p:nvSpPr>
+          <p:cNvPr id="7" name="Ellipse 6">
+            <a:extLst>
+              <a:ext uri="{FF2B5EF4-FFF2-40B4-BE49-F238E27FC236}">
+                <a16:creationId xmlns:a16="http://schemas.microsoft.com/office/drawing/2014/main" id="{BC69A899-06C0-40DE-993A-F6D39DC0156D}"/>
+              </a:ext>
+            </a:extLst>
+          </p:cNvPr>
+          <p:cNvSpPr/>
+          <p:nvPr/>
+        </p:nvSpPr>
+        <p:spPr bwMode="auto">
+          <a:xfrm>
+            <a:off x="6011947" y="2885128"/>
+            <a:ext cx="1019909" cy="422030"/>
+          </a:xfrm>
+          <a:prstGeom prst="ellipse">
+            <a:avLst/>
+          </a:prstGeom>
+          <a:noFill/>
+          <a:ln>
+            <a:headEnd type="none" w="med" len="med"/>
+            <a:tailEnd type="none" w="med" len="med"/>
+          </a:ln>
+        </p:spPr>
+        <p:style>
+          <a:lnRef idx="2">
+            <a:schemeClr val="accent6"/>
+          </a:lnRef>
+          <a:fillRef idx="1">
+            <a:schemeClr val="lt1"/>
+          </a:fillRef>
+          <a:effectRef idx="0">
+            <a:schemeClr val="accent6"/>
+          </a:effectRef>
+          <a:fontRef idx="minor">
+            <a:schemeClr val="dk1"/>
+          </a:fontRef>
+        </p:style>
+        <p:txBody>
+          <a:bodyPr vert="horz" wrap="square" lIns="0" tIns="0" rIns="0" bIns="0" numCol="1" rtlCol="0" anchor="ctr" anchorCtr="0" compatLnSpc="1">
+            <a:prstTxWarp prst="textNoShape">
+              <a:avLst/>
+            </a:prstTxWarp>
+            <a:spAutoFit/>
+          </a:bodyPr>
+          <a:lstStyle/>
+          <a:p>
+            <a:pPr marL="0" marR="0" indent="0" algn="l" defTabSz="914400" rtl="0" eaLnBrk="1" fontAlgn="base" latinLnBrk="0" hangingPunct="1">
+              <a:lnSpc>
+                <a:spcPct val="100000"/>
+              </a:lnSpc>
+              <a:spcBef>
+                <a:spcPct val="50000"/>
+              </a:spcBef>
+              <a:spcAft>
+                <a:spcPct val="0"/>
+              </a:spcAft>
+              <a:buClrTx/>
+              <a:buSzTx/>
+              <a:buFontTx/>
+              <a:buNone/>
+              <a:tabLst/>
+            </a:pPr>
+            <a:endParaRPr kumimoji="0" lang="fr-FR" sz="1800" b="0" i="0" u="none" strike="noStrike" cap="none" normalizeH="0" baseline="0">
+              <a:ln>
+                <a:noFill/>
+              </a:ln>
+              <a:solidFill>
+                <a:schemeClr val="tx1"/>
+              </a:solidFill>
+              <a:effectLst/>
+              <a:latin typeface="Tahoma" pitchFamily="34" charset="0"/>
+            </a:endParaRPr>
+          </a:p>
+        </p:txBody>
+      </p:sp>
+    </p:spTree>
+    <p:extLst>
+      <p:ext uri="{BB962C8B-B14F-4D97-AF65-F5344CB8AC3E}">
+        <p14:creationId xmlns:p14="http://schemas.microsoft.com/office/powerpoint/2010/main" val="3147285503"/>
+      </p:ext>
+    </p:extLst>
+  </p:cSld>
+  <p:clrMapOvr>
+    <a:masterClrMapping/>
+  </p:clrMapOvr>
+</p:sld>
+</file>
+
+<file path=ppt/slides/slide17.xml><?xml version="1.0" encoding="utf-8"?>
+<p:sld xmlns:a="http://schemas.openxmlformats.org/drawingml/2006/main" xmlns:r="http://schemas.openxmlformats.org/officeDocument/2006/relationships" xmlns:p="http://schemas.openxmlformats.org/presentationml/2006/main">
+  <p:cSld>
+    <p:spTree>
+      <p:nvGrpSpPr>
+        <p:cNvPr id="1" name=""/>
+        <p:cNvGrpSpPr/>
+        <p:nvPr/>
+      </p:nvGrpSpPr>
+      <p:grpSpPr>
+        <a:xfrm>
+          <a:off x="0" y="0"/>
+          <a:ext cx="0" cy="0"/>
+          <a:chOff x="0" y="0"/>
+          <a:chExt cx="0" cy="0"/>
+        </a:xfrm>
+      </p:grpSpPr>
+      <p:sp>
+        <p:nvSpPr>
+          <p:cNvPr id="2" name="Titre 1">
+            <a:extLst>
+              <a:ext uri="{FF2B5EF4-FFF2-40B4-BE49-F238E27FC236}">
+                <a16:creationId xmlns:a16="http://schemas.microsoft.com/office/drawing/2014/main" id="{36CFCD8D-DD1D-43E6-908F-6A737C1C0A51}"/>
+              </a:ext>
+            </a:extLst>
+          </p:cNvPr>
+          <p:cNvSpPr>
+            <a:spLocks noGrp="1"/>
+          </p:cNvSpPr>
+          <p:nvPr>
+            <p:ph type="title"/>
+          </p:nvPr>
+        </p:nvSpPr>
+        <p:spPr/>
+        <p:txBody>
+          <a:bodyPr/>
+          <a:lstStyle/>
+          <a:p>
+            <a:r>
+              <a:rPr lang="fr-FR" dirty="0"/>
+              <a:t>5. CNN – </a:t>
+            </a:r>
+            <a:r>
+              <a:rPr lang="fr-FR" dirty="0" err="1"/>
+              <a:t>accuracy</a:t>
+            </a:r>
+            <a:r>
+              <a:rPr lang="fr-FR" dirty="0"/>
+              <a:t> score – VGG-16</a:t>
+            </a:r>
+            <a:br>
+              <a:rPr lang="fr-FR" dirty="0"/>
+            </a:br>
+            <a:endParaRPr lang="fr-FR" dirty="0"/>
+          </a:p>
+        </p:txBody>
+      </p:sp>
+      <p:graphicFrame>
+        <p:nvGraphicFramePr>
+          <p:cNvPr id="4" name="Espace réservé du contenu 3">
+            <a:extLst>
+              <a:ext uri="{FF2B5EF4-FFF2-40B4-BE49-F238E27FC236}">
+                <a16:creationId xmlns:a16="http://schemas.microsoft.com/office/drawing/2014/main" id="{D6B0184B-D069-44C1-A192-889D62126BA6}"/>
+              </a:ext>
+            </a:extLst>
+          </p:cNvPr>
+          <p:cNvGraphicFramePr>
+            <a:graphicFrameLocks noGrp="1"/>
+          </p:cNvGraphicFramePr>
+          <p:nvPr>
+            <p:ph idx="1"/>
+            <p:extLst>
+              <p:ext uri="{D42A27DB-BD31-4B8C-83A1-F6EECF244321}">
+                <p14:modId xmlns:p14="http://schemas.microsoft.com/office/powerpoint/2010/main" val="4120060123"/>
+              </p:ext>
+            </p:extLst>
+          </p:nvPr>
+        </p:nvGraphicFramePr>
+        <p:xfrm>
+          <a:off x="242887" y="2624518"/>
+          <a:ext cx="11291888" cy="1483360"/>
         </p:xfrm>
         <a:graphic>
           <a:graphicData uri="http://schemas.openxmlformats.org/drawingml/2006/table">
@@ -6008,763 +6555,7 @@
                     <a:p>
                       <a:r>
                         <a:rPr lang="fr-FR" dirty="0"/>
-                        <a:t>89,8%</a:t>
-                      </a:r>
-                    </a:p>
-                  </a:txBody>
-                  <a:tcPr/>
-                </a:tc>
-                <a:tc>
-                  <a:txBody>
-                    <a:bodyPr/>
-                    <a:lstStyle/>
-                    <a:p>
-                      <a:r>
-                        <a:rPr lang="fr-FR" dirty="0"/>
-                        <a:t>89,8%</a:t>
-                      </a:r>
-                    </a:p>
-                  </a:txBody>
-                  <a:tcPr/>
-                </a:tc>
-                <a:tc>
-                  <a:txBody>
-                    <a:bodyPr/>
-                    <a:lstStyle/>
-                    <a:p>
-                      <a:r>
-                        <a:rPr lang="fr-FR" dirty="0"/>
-                        <a:t>91,2%</a:t>
-                      </a:r>
-                    </a:p>
-                  </a:txBody>
-                  <a:tcPr/>
-                </a:tc>
-                <a:extLst>
-                  <a:ext uri="{0D108BD9-81ED-4DB2-BD59-A6C34878D82A}">
-                    <a16:rowId xmlns:a16="http://schemas.microsoft.com/office/drawing/2014/main" val="2964425305"/>
-                  </a:ext>
-                </a:extLst>
-              </a:tr>
-              <a:tr h="370840">
-                <a:tc>
-                  <a:txBody>
-                    <a:bodyPr/>
-                    <a:lstStyle/>
-                    <a:p>
-                      <a:pPr marL="0" marR="0" lvl="0" indent="0" algn="l" defTabSz="914400" rtl="0" eaLnBrk="1" fontAlgn="auto" latinLnBrk="0" hangingPunct="1">
-                        <a:lnSpc>
-                          <a:spcPct val="100000"/>
-                        </a:lnSpc>
-                        <a:spcBef>
-                          <a:spcPts val="0"/>
-                        </a:spcBef>
-                        <a:spcAft>
-                          <a:spcPts val="0"/>
-                        </a:spcAft>
-                        <a:buClrTx/>
-                        <a:buSzTx/>
-                        <a:buFontTx/>
-                        <a:buNone/>
-                        <a:tabLst/>
-                        <a:defRPr/>
-                      </a:pPr>
-                      <a:r>
-                        <a:rPr lang="fr-FR" dirty="0"/>
-                        <a:t>2 races, 15 </a:t>
-                      </a:r>
-                      <a:r>
-                        <a:rPr lang="fr-FR" dirty="0" err="1"/>
-                        <a:t>epochs</a:t>
-                      </a:r>
-                      <a:endParaRPr lang="fr-FR" dirty="0"/>
-                    </a:p>
-                  </a:txBody>
-                  <a:tcPr/>
-                </a:tc>
-                <a:tc>
-                  <a:txBody>
-                    <a:bodyPr/>
-                    <a:lstStyle/>
-                    <a:p>
-                      <a:r>
-                        <a:rPr lang="fr-FR" dirty="0"/>
-                        <a:t>90,5%</a:t>
-                      </a:r>
-                    </a:p>
-                  </a:txBody>
-                  <a:tcPr/>
-                </a:tc>
-                <a:tc>
-                  <a:txBody>
-                    <a:bodyPr/>
-                    <a:lstStyle/>
-                    <a:p>
-                      <a:r>
-                        <a:rPr lang="fr-FR" dirty="0"/>
-                        <a:t>92,0%</a:t>
-                      </a:r>
-                    </a:p>
-                  </a:txBody>
-                  <a:tcPr/>
-                </a:tc>
-                <a:tc>
-                  <a:txBody>
-                    <a:bodyPr/>
-                    <a:lstStyle/>
-                    <a:p>
-                      <a:r>
-                        <a:rPr lang="fr-FR" dirty="0"/>
-                        <a:t>94,2%</a:t>
-                      </a:r>
-                    </a:p>
-                  </a:txBody>
-                  <a:tcPr/>
-                </a:tc>
-                <a:extLst>
-                  <a:ext uri="{0D108BD9-81ED-4DB2-BD59-A6C34878D82A}">
-                    <a16:rowId xmlns:a16="http://schemas.microsoft.com/office/drawing/2014/main" val="1281933322"/>
-                  </a:ext>
-                </a:extLst>
-              </a:tr>
-              <a:tr h="370840">
-                <a:tc>
-                  <a:txBody>
-                    <a:bodyPr/>
-                    <a:lstStyle/>
-                    <a:p>
-                      <a:pPr marL="0" marR="0" lvl="0" indent="0" algn="l" defTabSz="914400" rtl="0" eaLnBrk="1" fontAlgn="auto" latinLnBrk="0" hangingPunct="1">
-                        <a:lnSpc>
-                          <a:spcPct val="100000"/>
-                        </a:lnSpc>
-                        <a:spcBef>
-                          <a:spcPts val="0"/>
-                        </a:spcBef>
-                        <a:spcAft>
-                          <a:spcPts val="0"/>
-                        </a:spcAft>
-                        <a:buClrTx/>
-                        <a:buSzTx/>
-                        <a:buFontTx/>
-                        <a:buNone/>
-                        <a:tabLst/>
-                        <a:defRPr/>
-                      </a:pPr>
-                      <a:r>
-                        <a:rPr lang="fr-FR" dirty="0"/>
-                        <a:t>2 races, 20 </a:t>
-                      </a:r>
-                      <a:r>
-                        <a:rPr lang="fr-FR" dirty="0" err="1"/>
-                        <a:t>epochs</a:t>
-                      </a:r>
-                      <a:endParaRPr lang="fr-FR" dirty="0"/>
-                    </a:p>
-                  </a:txBody>
-                  <a:tcPr/>
-                </a:tc>
-                <a:tc>
-                  <a:txBody>
-                    <a:bodyPr/>
-                    <a:lstStyle/>
-                    <a:p>
-                      <a:r>
-                        <a:rPr lang="fr-FR" dirty="0"/>
-                        <a:t>91,2%</a:t>
-                      </a:r>
-                    </a:p>
-                  </a:txBody>
-                  <a:tcPr/>
-                </a:tc>
-                <a:tc>
-                  <a:txBody>
-                    <a:bodyPr/>
-                    <a:lstStyle/>
-                    <a:p>
-                      <a:r>
-                        <a:rPr lang="fr-FR" dirty="0"/>
-                        <a:t>94,2%</a:t>
-                      </a:r>
-                    </a:p>
-                  </a:txBody>
-                  <a:tcPr/>
-                </a:tc>
-                <a:tc>
-                  <a:txBody>
-                    <a:bodyPr/>
-                    <a:lstStyle/>
-                    <a:p>
-                      <a:r>
-                        <a:rPr lang="fr-FR" dirty="0"/>
-                        <a:t>93,4%</a:t>
-                      </a:r>
-                    </a:p>
-                  </a:txBody>
-                  <a:tcPr/>
-                </a:tc>
-                <a:extLst>
-                  <a:ext uri="{0D108BD9-81ED-4DB2-BD59-A6C34878D82A}">
-                    <a16:rowId xmlns:a16="http://schemas.microsoft.com/office/drawing/2014/main" val="2186525973"/>
-                  </a:ext>
-                </a:extLst>
-              </a:tr>
-              <a:tr h="370840">
-                <a:tc>
-                  <a:txBody>
-                    <a:bodyPr/>
-                    <a:lstStyle/>
-                    <a:p>
-                      <a:r>
-                        <a:rPr lang="fr-FR" dirty="0"/>
-                        <a:t>10 races, 20 </a:t>
-                      </a:r>
-                      <a:r>
-                        <a:rPr lang="fr-FR" dirty="0" err="1"/>
-                        <a:t>epochs</a:t>
-                      </a:r>
-                      <a:endParaRPr lang="fr-FR" dirty="0"/>
-                    </a:p>
-                  </a:txBody>
-                  <a:tcPr/>
-                </a:tc>
-                <a:tc>
-                  <a:txBody>
-                    <a:bodyPr/>
-                    <a:lstStyle/>
-                    <a:p>
-                      <a:endParaRPr lang="fr-FR" dirty="0"/>
-                    </a:p>
-                  </a:txBody>
-                  <a:tcPr/>
-                </a:tc>
-                <a:tc>
-                  <a:txBody>
-                    <a:bodyPr/>
-                    <a:lstStyle/>
-                    <a:p>
-                      <a:endParaRPr lang="fr-FR"/>
-                    </a:p>
-                  </a:txBody>
-                  <a:tcPr/>
-                </a:tc>
-                <a:tc>
-                  <a:txBody>
-                    <a:bodyPr/>
-                    <a:lstStyle/>
-                    <a:p>
-                      <a:r>
-                        <a:rPr lang="fr-FR"/>
-                        <a:t>71,9%</a:t>
-                      </a:r>
-                      <a:endParaRPr lang="fr-FR" dirty="0"/>
-                    </a:p>
-                  </a:txBody>
-                  <a:tcPr/>
-                </a:tc>
-                <a:extLst>
-                  <a:ext uri="{0D108BD9-81ED-4DB2-BD59-A6C34878D82A}">
-                    <a16:rowId xmlns:a16="http://schemas.microsoft.com/office/drawing/2014/main" val="1808344148"/>
-                  </a:ext>
-                </a:extLst>
-              </a:tr>
-              <a:tr h="370840">
-                <a:tc>
-                  <a:txBody>
-                    <a:bodyPr/>
-                    <a:lstStyle/>
-                    <a:p>
-                      <a:r>
-                        <a:rPr lang="fr-FR" dirty="0"/>
-                        <a:t>30 races, 20 </a:t>
-                      </a:r>
-                      <a:r>
-                        <a:rPr lang="fr-FR" dirty="0" err="1"/>
-                        <a:t>epochs</a:t>
-                      </a:r>
-                      <a:endParaRPr lang="fr-FR" dirty="0"/>
-                    </a:p>
-                  </a:txBody>
-                  <a:tcPr/>
-                </a:tc>
-                <a:tc>
-                  <a:txBody>
-                    <a:bodyPr/>
-                    <a:lstStyle/>
-                    <a:p>
-                      <a:endParaRPr lang="fr-FR"/>
-                    </a:p>
-                  </a:txBody>
-                  <a:tcPr/>
-                </a:tc>
-                <a:tc>
-                  <a:txBody>
-                    <a:bodyPr/>
-                    <a:lstStyle/>
-                    <a:p>
-                      <a:endParaRPr lang="fr-FR"/>
-                    </a:p>
-                  </a:txBody>
-                  <a:tcPr/>
-                </a:tc>
-                <a:tc>
-                  <a:txBody>
-                    <a:bodyPr/>
-                    <a:lstStyle/>
-                    <a:p>
-                      <a:r>
-                        <a:rPr lang="fr-FR"/>
-                        <a:t>53,8% (fit time 11h)</a:t>
-                      </a:r>
-                      <a:endParaRPr lang="fr-FR" dirty="0"/>
-                    </a:p>
-                  </a:txBody>
-                  <a:tcPr/>
-                </a:tc>
-                <a:extLst>
-                  <a:ext uri="{0D108BD9-81ED-4DB2-BD59-A6C34878D82A}">
-                    <a16:rowId xmlns:a16="http://schemas.microsoft.com/office/drawing/2014/main" val="4255103291"/>
-                  </a:ext>
-                </a:extLst>
-              </a:tr>
-              <a:tr h="370840">
-                <a:tc>
-                  <a:txBody>
-                    <a:bodyPr/>
-                    <a:lstStyle/>
-                    <a:p>
-                      <a:r>
-                        <a:rPr lang="fr-FR" dirty="0"/>
-                        <a:t>50 races, 20 </a:t>
-                      </a:r>
-                      <a:r>
-                        <a:rPr lang="fr-FR" dirty="0" err="1"/>
-                        <a:t>epochs</a:t>
-                      </a:r>
-                      <a:endParaRPr lang="fr-FR" dirty="0"/>
-                    </a:p>
-                  </a:txBody>
-                  <a:tcPr/>
-                </a:tc>
-                <a:tc>
-                  <a:txBody>
-                    <a:bodyPr/>
-                    <a:lstStyle/>
-                    <a:p>
-                      <a:endParaRPr lang="fr-FR" dirty="0"/>
-                    </a:p>
-                  </a:txBody>
-                  <a:tcPr/>
-                </a:tc>
-                <a:tc>
-                  <a:txBody>
-                    <a:bodyPr/>
-                    <a:lstStyle/>
-                    <a:p>
-                      <a:endParaRPr lang="fr-FR" dirty="0"/>
-                    </a:p>
-                  </a:txBody>
-                  <a:tcPr/>
-                </a:tc>
-                <a:tc>
-                  <a:txBody>
-                    <a:bodyPr/>
-                    <a:lstStyle/>
-                    <a:p>
-                      <a:r>
-                        <a:rPr lang="fr-FR" dirty="0"/>
-                        <a:t>55,8% (fit time 20h</a:t>
-                      </a:r>
-                    </a:p>
-                  </a:txBody>
-                  <a:tcPr/>
-                </a:tc>
-                <a:extLst>
-                  <a:ext uri="{0D108BD9-81ED-4DB2-BD59-A6C34878D82A}">
-                    <a16:rowId xmlns:a16="http://schemas.microsoft.com/office/drawing/2014/main" val="3320849276"/>
-                  </a:ext>
-                </a:extLst>
-              </a:tr>
-            </a:tbl>
-          </a:graphicData>
-        </a:graphic>
-      </p:graphicFrame>
-      <p:sp>
-        <p:nvSpPr>
-          <p:cNvPr id="3" name="ZoneTexte 2">
-            <a:extLst>
-              <a:ext uri="{FF2B5EF4-FFF2-40B4-BE49-F238E27FC236}">
-                <a16:creationId xmlns:a16="http://schemas.microsoft.com/office/drawing/2014/main" id="{324A0D51-CAFB-4F02-9BDD-56E7C82159F3}"/>
-              </a:ext>
-            </a:extLst>
-          </p:cNvPr>
-          <p:cNvSpPr txBox="1"/>
-          <p:nvPr/>
-        </p:nvSpPr>
-        <p:spPr>
-          <a:xfrm>
-            <a:off x="297656" y="4352266"/>
-            <a:ext cx="11282652" cy="1061829"/>
-          </a:xfrm>
-          <a:prstGeom prst="rect">
-            <a:avLst/>
-          </a:prstGeom>
-          <a:noFill/>
-        </p:spPr>
-        <p:txBody>
-          <a:bodyPr wrap="square" rtlCol="0">
-            <a:spAutoFit/>
-          </a:bodyPr>
-          <a:lstStyle/>
-          <a:p>
-            <a:r>
-              <a:rPr lang="fr-FR" dirty="0"/>
-              <a:t>Une </a:t>
-            </a:r>
-            <a:r>
-              <a:rPr lang="fr-FR" dirty="0" err="1"/>
-              <a:t>epoch</a:t>
-            </a:r>
-            <a:r>
-              <a:rPr lang="fr-FR" dirty="0"/>
-              <a:t> est une itération complète sur l’ensemble des valeurs X et Y du jeu d’entraînement.</a:t>
-            </a:r>
-          </a:p>
-          <a:p>
-            <a:r>
-              <a:rPr lang="fr-FR" dirty="0"/>
-              <a:t>La légère dégradation de l’</a:t>
-            </a:r>
-            <a:r>
-              <a:rPr lang="fr-FR" dirty="0" err="1"/>
-              <a:t>accuracy</a:t>
-            </a:r>
-            <a:r>
-              <a:rPr lang="fr-FR" dirty="0"/>
-              <a:t> dans le cas de 20 </a:t>
-            </a:r>
-            <a:r>
-              <a:rPr lang="fr-FR" dirty="0" err="1"/>
-              <a:t>epochs</a:t>
-            </a:r>
-            <a:r>
-              <a:rPr lang="fr-FR" dirty="0"/>
-              <a:t> et le fine tuning total peut faire penser à une situation d’over-</a:t>
-            </a:r>
-            <a:r>
-              <a:rPr lang="fr-FR" dirty="0" err="1"/>
-              <a:t>fitting</a:t>
-            </a:r>
-            <a:r>
-              <a:rPr lang="fr-FR" dirty="0"/>
-              <a:t>.</a:t>
-            </a:r>
-          </a:p>
-        </p:txBody>
-      </p:sp>
-      <p:sp>
-        <p:nvSpPr>
-          <p:cNvPr id="7" name="Ellipse 6">
-            <a:extLst>
-              <a:ext uri="{FF2B5EF4-FFF2-40B4-BE49-F238E27FC236}">
-                <a16:creationId xmlns:a16="http://schemas.microsoft.com/office/drawing/2014/main" id="{BC69A899-06C0-40DE-993A-F6D39DC0156D}"/>
-              </a:ext>
-            </a:extLst>
-          </p:cNvPr>
-          <p:cNvSpPr/>
-          <p:nvPr/>
-        </p:nvSpPr>
-        <p:spPr bwMode="auto">
-          <a:xfrm>
-            <a:off x="8651630" y="2607262"/>
-            <a:ext cx="1019909" cy="422030"/>
-          </a:xfrm>
-          <a:prstGeom prst="ellipse">
-            <a:avLst/>
-          </a:prstGeom>
-          <a:noFill/>
-          <a:ln>
-            <a:headEnd type="none" w="med" len="med"/>
-            <a:tailEnd type="none" w="med" len="med"/>
-          </a:ln>
-        </p:spPr>
-        <p:style>
-          <a:lnRef idx="2">
-            <a:schemeClr val="accent6"/>
-          </a:lnRef>
-          <a:fillRef idx="1">
-            <a:schemeClr val="lt1"/>
-          </a:fillRef>
-          <a:effectRef idx="0">
-            <a:schemeClr val="accent6"/>
-          </a:effectRef>
-          <a:fontRef idx="minor">
-            <a:schemeClr val="dk1"/>
-          </a:fontRef>
-        </p:style>
-        <p:txBody>
-          <a:bodyPr vert="horz" wrap="square" lIns="0" tIns="0" rIns="0" bIns="0" numCol="1" rtlCol="0" anchor="ctr" anchorCtr="0" compatLnSpc="1">
-            <a:prstTxWarp prst="textNoShape">
-              <a:avLst/>
-            </a:prstTxWarp>
-            <a:spAutoFit/>
-          </a:bodyPr>
-          <a:lstStyle/>
-          <a:p>
-            <a:pPr marL="0" marR="0" indent="0" algn="l" defTabSz="914400" rtl="0" eaLnBrk="1" fontAlgn="base" latinLnBrk="0" hangingPunct="1">
-              <a:lnSpc>
-                <a:spcPct val="100000"/>
-              </a:lnSpc>
-              <a:spcBef>
-                <a:spcPct val="50000"/>
-              </a:spcBef>
-              <a:spcAft>
-                <a:spcPct val="0"/>
-              </a:spcAft>
-              <a:buClrTx/>
-              <a:buSzTx/>
-              <a:buFontTx/>
-              <a:buNone/>
-              <a:tabLst/>
-            </a:pPr>
-            <a:endParaRPr kumimoji="0" lang="fr-FR" sz="1800" b="0" i="0" u="none" strike="noStrike" cap="none" normalizeH="0" baseline="0">
-              <a:ln>
-                <a:noFill/>
-              </a:ln>
-              <a:solidFill>
-                <a:schemeClr val="tx1"/>
-              </a:solidFill>
-              <a:effectLst/>
-              <a:latin typeface="Tahoma" pitchFamily="34" charset="0"/>
-            </a:endParaRPr>
-          </a:p>
-        </p:txBody>
-      </p:sp>
-    </p:spTree>
-    <p:extLst>
-      <p:ext uri="{BB962C8B-B14F-4D97-AF65-F5344CB8AC3E}">
-        <p14:creationId xmlns:p14="http://schemas.microsoft.com/office/powerpoint/2010/main" val="3147285503"/>
-      </p:ext>
-    </p:extLst>
-  </p:cSld>
-  <p:clrMapOvr>
-    <a:masterClrMapping/>
-  </p:clrMapOvr>
-</p:sld>
-</file>
-
-<file path=ppt/slides/slide19.xml><?xml version="1.0" encoding="utf-8"?>
-<p:sld xmlns:a="http://schemas.openxmlformats.org/drawingml/2006/main" xmlns:r="http://schemas.openxmlformats.org/officeDocument/2006/relationships" xmlns:p="http://schemas.openxmlformats.org/presentationml/2006/main">
-  <p:cSld>
-    <p:spTree>
-      <p:nvGrpSpPr>
-        <p:cNvPr id="1" name=""/>
-        <p:cNvGrpSpPr/>
-        <p:nvPr/>
-      </p:nvGrpSpPr>
-      <p:grpSpPr>
-        <a:xfrm>
-          <a:off x="0" y="0"/>
-          <a:ext cx="0" cy="0"/>
-          <a:chOff x="0" y="0"/>
-          <a:chExt cx="0" cy="0"/>
-        </a:xfrm>
-      </p:grpSpPr>
-      <p:sp>
-        <p:nvSpPr>
-          <p:cNvPr id="2" name="Titre 1">
-            <a:extLst>
-              <a:ext uri="{FF2B5EF4-FFF2-40B4-BE49-F238E27FC236}">
-                <a16:creationId xmlns:a16="http://schemas.microsoft.com/office/drawing/2014/main" id="{36CFCD8D-DD1D-43E6-908F-6A737C1C0A51}"/>
-              </a:ext>
-            </a:extLst>
-          </p:cNvPr>
-          <p:cNvSpPr>
-            <a:spLocks noGrp="1"/>
-          </p:cNvSpPr>
-          <p:nvPr>
-            <p:ph type="title"/>
-          </p:nvPr>
-        </p:nvSpPr>
-        <p:spPr/>
-        <p:txBody>
-          <a:bodyPr/>
-          <a:lstStyle/>
-          <a:p>
-            <a:r>
-              <a:rPr lang="fr-FR" dirty="0"/>
-              <a:t>5. CNN – </a:t>
-            </a:r>
-            <a:r>
-              <a:rPr lang="fr-FR" dirty="0" err="1"/>
-              <a:t>accuracy</a:t>
-            </a:r>
-            <a:r>
-              <a:rPr lang="fr-FR" dirty="0"/>
-              <a:t> score – VGG-16</a:t>
-            </a:r>
-            <a:br>
-              <a:rPr lang="fr-FR" dirty="0"/>
-            </a:br>
-            <a:endParaRPr lang="fr-FR" dirty="0"/>
-          </a:p>
-        </p:txBody>
-      </p:sp>
-      <p:graphicFrame>
-        <p:nvGraphicFramePr>
-          <p:cNvPr id="4" name="Espace réservé du contenu 3">
-            <a:extLst>
-              <a:ext uri="{FF2B5EF4-FFF2-40B4-BE49-F238E27FC236}">
-                <a16:creationId xmlns:a16="http://schemas.microsoft.com/office/drawing/2014/main" id="{D6B0184B-D069-44C1-A192-889D62126BA6}"/>
-              </a:ext>
-            </a:extLst>
-          </p:cNvPr>
-          <p:cNvGraphicFramePr>
-            <a:graphicFrameLocks noGrp="1"/>
-          </p:cNvGraphicFramePr>
-          <p:nvPr>
-            <p:ph idx="1"/>
-            <p:extLst>
-              <p:ext uri="{D42A27DB-BD31-4B8C-83A1-F6EECF244321}">
-                <p14:modId xmlns:p14="http://schemas.microsoft.com/office/powerpoint/2010/main" val="3971638479"/>
-              </p:ext>
-            </p:extLst>
-          </p:nvPr>
-        </p:nvGraphicFramePr>
-        <p:xfrm>
-          <a:off x="297656" y="1520337"/>
-          <a:ext cx="11291888" cy="2595880"/>
-        </p:xfrm>
-        <a:graphic>
-          <a:graphicData uri="http://schemas.openxmlformats.org/drawingml/2006/table">
-            <a:tbl>
-              <a:tblPr firstRow="1" bandRow="1">
-                <a:tableStyleId>{5C22544A-7EE6-4342-B048-85BDC9FD1C3A}</a:tableStyleId>
-              </a:tblPr>
-              <a:tblGrid>
-                <a:gridCol w="2822972">
-                  <a:extLst>
-                    <a:ext uri="{9D8B030D-6E8A-4147-A177-3AD203B41FA5}">
-                      <a16:colId xmlns:a16="http://schemas.microsoft.com/office/drawing/2014/main" val="2271525431"/>
-                    </a:ext>
-                  </a:extLst>
-                </a:gridCol>
-                <a:gridCol w="2822972">
-                  <a:extLst>
-                    <a:ext uri="{9D8B030D-6E8A-4147-A177-3AD203B41FA5}">
-                      <a16:colId xmlns:a16="http://schemas.microsoft.com/office/drawing/2014/main" val="1813573895"/>
-                    </a:ext>
-                  </a:extLst>
-                </a:gridCol>
-                <a:gridCol w="2822972">
-                  <a:extLst>
-                    <a:ext uri="{9D8B030D-6E8A-4147-A177-3AD203B41FA5}">
-                      <a16:colId xmlns:a16="http://schemas.microsoft.com/office/drawing/2014/main" val="3279943356"/>
-                    </a:ext>
-                  </a:extLst>
-                </a:gridCol>
-                <a:gridCol w="2822972">
-                  <a:extLst>
-                    <a:ext uri="{9D8B030D-6E8A-4147-A177-3AD203B41FA5}">
-                      <a16:colId xmlns:a16="http://schemas.microsoft.com/office/drawing/2014/main" val="1719126174"/>
-                    </a:ext>
-                  </a:extLst>
-                </a:gridCol>
-              </a:tblGrid>
-              <a:tr h="370840">
-                <a:tc>
-                  <a:txBody>
-                    <a:bodyPr/>
-                    <a:lstStyle/>
-                    <a:p>
-                      <a:r>
-                        <a:rPr lang="fr-FR" dirty="0" err="1"/>
-                        <a:t>Strategy</a:t>
-                      </a:r>
-                      <a:r>
-                        <a:rPr lang="fr-FR" dirty="0"/>
-                        <a:t>:</a:t>
-                      </a:r>
-                    </a:p>
-                  </a:txBody>
-                  <a:tcPr/>
-                </a:tc>
-                <a:tc>
-                  <a:txBody>
-                    <a:bodyPr/>
-                    <a:lstStyle/>
-                    <a:p>
-                      <a:r>
-                        <a:rPr lang="fr-FR" dirty="0"/>
-                        <a:t>Extraction de </a:t>
-                      </a:r>
-                      <a:r>
-                        <a:rPr lang="fr-FR" dirty="0" err="1"/>
-                        <a:t>features</a:t>
-                      </a:r>
-                      <a:endParaRPr lang="fr-FR" dirty="0"/>
-                    </a:p>
-                  </a:txBody>
-                  <a:tcPr/>
-                </a:tc>
-                <a:tc>
-                  <a:txBody>
-                    <a:bodyPr/>
-                    <a:lstStyle/>
-                    <a:p>
-                      <a:r>
-                        <a:rPr lang="fr-FR" dirty="0"/>
-                        <a:t>Fine tuning partiel</a:t>
-                      </a:r>
-                    </a:p>
-                  </a:txBody>
-                  <a:tcPr/>
-                </a:tc>
-                <a:tc>
-                  <a:txBody>
-                    <a:bodyPr/>
-                    <a:lstStyle/>
-                    <a:p>
-                      <a:r>
-                        <a:rPr lang="fr-FR" dirty="0"/>
-                        <a:t>Fine tuning total</a:t>
-                      </a:r>
-                    </a:p>
-                  </a:txBody>
-                  <a:tcPr/>
-                </a:tc>
-                <a:extLst>
-                  <a:ext uri="{0D108BD9-81ED-4DB2-BD59-A6C34878D82A}">
-                    <a16:rowId xmlns:a16="http://schemas.microsoft.com/office/drawing/2014/main" val="633089155"/>
-                  </a:ext>
-                </a:extLst>
-              </a:tr>
-              <a:tr h="370840">
-                <a:tc>
-                  <a:txBody>
-                    <a:bodyPr/>
-                    <a:lstStyle/>
-                    <a:p>
-                      <a:r>
-                        <a:rPr lang="fr-FR" dirty="0"/>
-                        <a:t>2 races, 10 </a:t>
-                      </a:r>
-                      <a:r>
-                        <a:rPr lang="fr-FR" dirty="0" err="1"/>
-                        <a:t>epochs</a:t>
-                      </a:r>
-                      <a:endParaRPr lang="fr-FR" dirty="0"/>
-                    </a:p>
-                  </a:txBody>
-                  <a:tcPr/>
-                </a:tc>
-                <a:tc>
-                  <a:txBody>
-                    <a:bodyPr/>
-                    <a:lstStyle/>
-                    <a:p>
-                      <a:r>
-                        <a:rPr lang="fr-FR" dirty="0"/>
-                        <a:t>89,8% (fit time = 8mn)</a:t>
+                        <a:t>89,8% (fit time 8mn)</a:t>
                       </a:r>
                     </a:p>
                   </a:txBody>
@@ -6808,26 +6599,13 @@
                     <a:bodyPr/>
                     <a:lstStyle/>
                     <a:p>
-                      <a:pPr marL="0" marR="0" lvl="0" indent="0" algn="l" defTabSz="914400" rtl="0" eaLnBrk="1" fontAlgn="auto" latinLnBrk="0" hangingPunct="1">
-                        <a:lnSpc>
-                          <a:spcPct val="100000"/>
-                        </a:lnSpc>
-                        <a:spcBef>
-                          <a:spcPts val="0"/>
-                        </a:spcBef>
-                        <a:spcAft>
-                          <a:spcPts val="0"/>
-                        </a:spcAft>
-                        <a:buClrTx/>
-                        <a:buSzTx/>
-                        <a:buFontTx/>
-                        <a:buNone/>
-                        <a:tabLst/>
-                        <a:defRPr/>
-                      </a:pPr>
                       <a:r>
                         <a:rPr lang="fr-FR" dirty="0"/>
-                        <a:t>2 races, 15 </a:t>
+                        <a:t>10 races</a:t>
+                      </a:r>
+                      <a:r>
+                        <a:rPr lang="fr-FR"/>
+                        <a:t>, 10 </a:t>
                       </a:r>
                       <a:r>
                         <a:rPr lang="fr-FR" dirty="0" err="1"/>
@@ -6843,7 +6621,10 @@
                     <a:bodyPr/>
                     <a:lstStyle/>
                     <a:p>
-                      <a:endParaRPr lang="fr-FR" dirty="0"/>
+                      <a:r>
+                        <a:rPr lang="fr-FR" dirty="0"/>
+                        <a:t>56,1% (fit time 36mn)</a:t>
+                      </a:r>
                     </a:p>
                   </a:txBody>
                   <a:tcPr/>
@@ -6853,7 +6634,10 @@
                     <a:bodyPr/>
                     <a:lstStyle/>
                     <a:p>
-                      <a:endParaRPr lang="fr-FR" dirty="0"/>
+                      <a:r>
+                        <a:rPr lang="fr-FR" dirty="0"/>
+                        <a:t>(fit time </a:t>
+                      </a:r>
                     </a:p>
                   </a:txBody>
                   <a:tcPr/>
@@ -6863,86 +6647,17 @@
                     <a:bodyPr/>
                     <a:lstStyle/>
                     <a:p>
-                      <a:endParaRPr lang="fr-FR" dirty="0"/>
+                      <a:r>
+                        <a:rPr lang="fr-FR" dirty="0"/>
+                        <a:t>70,2% (fit time 2h)</a:t>
+                      </a:r>
                     </a:p>
                   </a:txBody>
                   <a:tcPr/>
                 </a:tc>
                 <a:extLst>
                   <a:ext uri="{0D108BD9-81ED-4DB2-BD59-A6C34878D82A}">
-                    <a16:rowId xmlns:a16="http://schemas.microsoft.com/office/drawing/2014/main" val="1281933322"/>
-                  </a:ext>
-                </a:extLst>
-              </a:tr>
-              <a:tr h="370840">
-                <a:tc>
-                  <a:txBody>
-                    <a:bodyPr/>
-                    <a:lstStyle/>
-                    <a:p>
-                      <a:pPr marL="0" marR="0" lvl="0" indent="0" algn="l" defTabSz="914400" rtl="0" eaLnBrk="1" fontAlgn="auto" latinLnBrk="0" hangingPunct="1">
-                        <a:lnSpc>
-                          <a:spcPct val="100000"/>
-                        </a:lnSpc>
-                        <a:spcBef>
-                          <a:spcPts val="0"/>
-                        </a:spcBef>
-                        <a:spcAft>
-                          <a:spcPts val="0"/>
-                        </a:spcAft>
-                        <a:buClrTx/>
-                        <a:buSzTx/>
-                        <a:buFontTx/>
-                        <a:buNone/>
-                        <a:tabLst/>
-                        <a:defRPr/>
-                      </a:pPr>
-                      <a:r>
-                        <a:rPr lang="fr-FR" dirty="0"/>
-                        <a:t>2 races, 20 </a:t>
-                      </a:r>
-                      <a:r>
-                        <a:rPr lang="fr-FR" dirty="0" err="1"/>
-                        <a:t>epochs</a:t>
-                      </a:r>
-                      <a:endParaRPr lang="fr-FR" dirty="0"/>
-                    </a:p>
-                  </a:txBody>
-                  <a:tcPr/>
-                </a:tc>
-                <a:tc>
-                  <a:txBody>
-                    <a:bodyPr/>
-                    <a:lstStyle/>
-                    <a:p>
-                      <a:endParaRPr lang="fr-FR" dirty="0"/>
-                    </a:p>
-                  </a:txBody>
-                  <a:tcPr/>
-                </a:tc>
-                <a:tc>
-                  <a:txBody>
-                    <a:bodyPr/>
-                    <a:lstStyle/>
-                    <a:p>
-                      <a:endParaRPr lang="fr-FR" dirty="0"/>
-                    </a:p>
-                  </a:txBody>
-                  <a:tcPr/>
-                </a:tc>
-                <a:tc>
-                  <a:txBody>
-                    <a:bodyPr/>
-                    <a:lstStyle/>
-                    <a:p>
-                      <a:endParaRPr lang="fr-FR" dirty="0"/>
-                    </a:p>
-                  </a:txBody>
-                  <a:tcPr/>
-                </a:tc>
-                <a:extLst>
-                  <a:ext uri="{0D108BD9-81ED-4DB2-BD59-A6C34878D82A}">
-                    <a16:rowId xmlns:a16="http://schemas.microsoft.com/office/drawing/2014/main" val="2186525973"/>
+                    <a16:rowId xmlns:a16="http://schemas.microsoft.com/office/drawing/2014/main" val="1808344148"/>
                   </a:ext>
                 </a:extLst>
               </a:tr>
@@ -6954,7 +6669,7 @@
                     <a:p>
                       <a:r>
                         <a:rPr lang="fr-FR" dirty="0"/>
-                        <a:t>10 races, 20 </a:t>
+                        <a:t>30 races, 10 </a:t>
                       </a:r>
                       <a:r>
                         <a:rPr lang="fr-FR" dirty="0" err="1"/>
@@ -6990,62 +6705,10 @@
                     <a:bodyPr/>
                     <a:lstStyle/>
                     <a:p>
-                      <a:endParaRPr lang="fr-FR" dirty="0"/>
-                    </a:p>
-                  </a:txBody>
-                  <a:tcPr/>
-                </a:tc>
-                <a:extLst>
-                  <a:ext uri="{0D108BD9-81ED-4DB2-BD59-A6C34878D82A}">
-                    <a16:rowId xmlns:a16="http://schemas.microsoft.com/office/drawing/2014/main" val="1808344148"/>
-                  </a:ext>
-                </a:extLst>
-              </a:tr>
-              <a:tr h="370840">
-                <a:tc>
-                  <a:txBody>
-                    <a:bodyPr/>
-                    <a:lstStyle/>
-                    <a:p>
                       <a:r>
                         <a:rPr lang="fr-FR" dirty="0"/>
-                        <a:t>30 races, 20 </a:t>
+                        <a:t>54,8% (fit time 5,5h)</a:t>
                       </a:r>
-                      <a:r>
-                        <a:rPr lang="fr-FR" dirty="0" err="1"/>
-                        <a:t>epochs</a:t>
-                      </a:r>
-                      <a:endParaRPr lang="fr-FR" dirty="0"/>
-                    </a:p>
-                  </a:txBody>
-                  <a:tcPr/>
-                </a:tc>
-                <a:tc>
-                  <a:txBody>
-                    <a:bodyPr/>
-                    <a:lstStyle/>
-                    <a:p>
-                      <a:endParaRPr lang="fr-FR"/>
-                    </a:p>
-                  </a:txBody>
-                  <a:tcPr/>
-                </a:tc>
-                <a:tc>
-                  <a:txBody>
-                    <a:bodyPr/>
-                    <a:lstStyle/>
-                    <a:p>
-                      <a:endParaRPr lang="fr-FR"/>
-                    </a:p>
-                  </a:txBody>
-                  <a:tcPr/>
-                </a:tc>
-                <a:tc>
-                  <a:txBody>
-                    <a:bodyPr/>
-                    <a:lstStyle/>
-                    <a:p>
-                      <a:endParaRPr lang="fr-FR" dirty="0"/>
                     </a:p>
                   </a:txBody>
                   <a:tcPr/>
@@ -7056,65 +6719,61 @@
                   </a:ext>
                 </a:extLst>
               </a:tr>
-              <a:tr h="370840">
-                <a:tc>
-                  <a:txBody>
-                    <a:bodyPr/>
-                    <a:lstStyle/>
-                    <a:p>
-                      <a:r>
-                        <a:rPr lang="fr-FR" dirty="0"/>
-                        <a:t>50 races, 20 </a:t>
-                      </a:r>
-                      <a:r>
-                        <a:rPr lang="fr-FR" dirty="0" err="1"/>
-                        <a:t>epochs</a:t>
-                      </a:r>
-                      <a:endParaRPr lang="fr-FR" dirty="0"/>
-                    </a:p>
-                  </a:txBody>
-                  <a:tcPr/>
-                </a:tc>
-                <a:tc>
-                  <a:txBody>
-                    <a:bodyPr/>
-                    <a:lstStyle/>
-                    <a:p>
-                      <a:endParaRPr lang="fr-FR" dirty="0"/>
-                    </a:p>
-                  </a:txBody>
-                  <a:tcPr/>
-                </a:tc>
-                <a:tc>
-                  <a:txBody>
-                    <a:bodyPr/>
-                    <a:lstStyle/>
-                    <a:p>
-                      <a:endParaRPr lang="fr-FR" dirty="0"/>
-                    </a:p>
-                  </a:txBody>
-                  <a:tcPr/>
-                </a:tc>
-                <a:tc>
-                  <a:txBody>
-                    <a:bodyPr/>
-                    <a:lstStyle/>
-                    <a:p>
-                      <a:endParaRPr lang="fr-FR" dirty="0"/>
-                    </a:p>
-                  </a:txBody>
-                  <a:tcPr/>
-                </a:tc>
-                <a:extLst>
-                  <a:ext uri="{0D108BD9-81ED-4DB2-BD59-A6C34878D82A}">
-                    <a16:rowId xmlns:a16="http://schemas.microsoft.com/office/drawing/2014/main" val="3320849276"/>
-                  </a:ext>
-                </a:extLst>
-              </a:tr>
             </a:tbl>
           </a:graphicData>
         </a:graphic>
       </p:graphicFrame>
+      <p:sp>
+        <p:nvSpPr>
+          <p:cNvPr id="5" name="ZoneTexte 4">
+            <a:extLst>
+              <a:ext uri="{FF2B5EF4-FFF2-40B4-BE49-F238E27FC236}">
+                <a16:creationId xmlns:a16="http://schemas.microsoft.com/office/drawing/2014/main" id="{6425B95D-BE4A-4939-AD23-19FDF9E0DA81}"/>
+              </a:ext>
+            </a:extLst>
+          </p:cNvPr>
+          <p:cNvSpPr txBox="1"/>
+          <p:nvPr/>
+        </p:nvSpPr>
+        <p:spPr>
+          <a:xfrm>
+            <a:off x="297656" y="1811116"/>
+            <a:ext cx="11282652" cy="369332"/>
+          </a:xfrm>
+          <a:prstGeom prst="rect">
+            <a:avLst/>
+          </a:prstGeom>
+          <a:noFill/>
+        </p:spPr>
+        <p:txBody>
+          <a:bodyPr wrap="square" rtlCol="0">
+            <a:spAutoFit/>
+          </a:bodyPr>
+          <a:lstStyle/>
+          <a:p>
+            <a:r>
+              <a:rPr lang="fr-FR" dirty="0"/>
+              <a:t>Quelques exemples de résultats avec 3 couches </a:t>
+            </a:r>
+            <a:r>
+              <a:rPr lang="fr-FR" dirty="0" err="1"/>
+              <a:t>fully</a:t>
+            </a:r>
+            <a:r>
+              <a:rPr lang="fr-FR" dirty="0"/>
+              <a:t> </a:t>
+            </a:r>
+            <a:r>
+              <a:rPr lang="fr-FR" dirty="0" err="1"/>
+              <a:t>connected</a:t>
+            </a:r>
+            <a:r>
+              <a:rPr lang="fr-FR" dirty="0"/>
+              <a:t>, donc un total de 16 couches.</a:t>
+            </a:r>
+          </a:p>
+        </p:txBody>
+      </p:sp>
     </p:spTree>
     <p:extLst>
       <p:ext uri="{BB962C8B-B14F-4D97-AF65-F5344CB8AC3E}">
@@ -7128,124 +6787,7 @@
 </p:sld>
 </file>
 
-<file path=ppt/slides/slide2.xml><?xml version="1.0" encoding="utf-8"?>
-<p:sld xmlns:a="http://schemas.openxmlformats.org/drawingml/2006/main" xmlns:r="http://schemas.openxmlformats.org/officeDocument/2006/relationships" xmlns:p="http://schemas.openxmlformats.org/presentationml/2006/main">
-  <p:cSld>
-    <p:spTree>
-      <p:nvGrpSpPr>
-        <p:cNvPr id="1" name=""/>
-        <p:cNvGrpSpPr/>
-        <p:nvPr/>
-      </p:nvGrpSpPr>
-      <p:grpSpPr>
-        <a:xfrm>
-          <a:off x="0" y="0"/>
-          <a:ext cx="0" cy="0"/>
-          <a:chOff x="0" y="0"/>
-          <a:chExt cx="0" cy="0"/>
-        </a:xfrm>
-      </p:grpSpPr>
-      <p:sp>
-        <p:nvSpPr>
-          <p:cNvPr id="4" name="Titre 3">
-            <a:extLst>
-              <a:ext uri="{FF2B5EF4-FFF2-40B4-BE49-F238E27FC236}">
-                <a16:creationId xmlns:a16="http://schemas.microsoft.com/office/drawing/2014/main" id="{94541D3B-25D8-4DAB-B18A-CD876226466A}"/>
-              </a:ext>
-            </a:extLst>
-          </p:cNvPr>
-          <p:cNvSpPr>
-            <a:spLocks noGrp="1"/>
-          </p:cNvSpPr>
-          <p:nvPr>
-            <p:ph type="title"/>
-          </p:nvPr>
-        </p:nvSpPr>
-        <p:spPr/>
-        <p:txBody>
-          <a:bodyPr/>
-          <a:lstStyle/>
-          <a:p>
-            <a:r>
-              <a:rPr lang="fr-FR" dirty="0"/>
-              <a:t>SOMMAIRE</a:t>
-            </a:r>
-          </a:p>
-        </p:txBody>
-      </p:sp>
-      <p:sp>
-        <p:nvSpPr>
-          <p:cNvPr id="5" name="Espace réservé du contenu 4">
-            <a:extLst>
-              <a:ext uri="{FF2B5EF4-FFF2-40B4-BE49-F238E27FC236}">
-                <a16:creationId xmlns:a16="http://schemas.microsoft.com/office/drawing/2014/main" id="{C70A2D34-4EEF-475E-8703-AE6595F75788}"/>
-              </a:ext>
-            </a:extLst>
-          </p:cNvPr>
-          <p:cNvSpPr>
-            <a:spLocks noGrp="1"/>
-          </p:cNvSpPr>
-          <p:nvPr>
-            <p:ph sz="quarter" idx="10"/>
-          </p:nvPr>
-        </p:nvSpPr>
-        <p:spPr>
-          <a:xfrm>
-            <a:off x="200025" y="953037"/>
-            <a:ext cx="11298238" cy="5293217"/>
-          </a:xfrm>
-        </p:spPr>
-        <p:txBody>
-          <a:bodyPr>
-            <a:normAutofit/>
-          </a:bodyPr>
-          <a:lstStyle/>
-          <a:p>
-            <a:r>
-              <a:rPr lang="fr-FR" sz="2400" dirty="0"/>
-              <a:t>Présentation de la démarche</a:t>
-            </a:r>
-          </a:p>
-          <a:p>
-            <a:r>
-              <a:rPr lang="fr-FR" sz="2400" dirty="0"/>
-              <a:t>Analyse et préparation des données</a:t>
-            </a:r>
-          </a:p>
-          <a:p>
-            <a:r>
-              <a:rPr lang="fr-FR" sz="2400" dirty="0"/>
-              <a:t>Méthode SIFT</a:t>
-            </a:r>
-          </a:p>
-          <a:p>
-            <a:r>
-              <a:rPr lang="fr-FR" sz="2400" dirty="0"/>
-              <a:t>Méthode CNN</a:t>
-            </a:r>
-          </a:p>
-          <a:p>
-            <a:r>
-              <a:rPr lang="fr-FR" sz="2400" dirty="0"/>
-              <a:t>Programme de test</a:t>
-            </a:r>
-          </a:p>
-        </p:txBody>
-      </p:sp>
-    </p:spTree>
-    <p:extLst>
-      <p:ext uri="{BB962C8B-B14F-4D97-AF65-F5344CB8AC3E}">
-        <p14:creationId xmlns:p14="http://schemas.microsoft.com/office/powerpoint/2010/main" val="4004448443"/>
-      </p:ext>
-    </p:extLst>
-  </p:cSld>
-  <p:clrMapOvr>
-    <a:masterClrMapping/>
-  </p:clrMapOvr>
-</p:sld>
-</file>
-
-<file path=ppt/slides/slide20.xml><?xml version="1.0" encoding="utf-8"?>
+<file path=ppt/slides/slide18.xml><?xml version="1.0" encoding="utf-8"?>
 <p:sld xmlns:a="http://schemas.openxmlformats.org/drawingml/2006/main" xmlns:r="http://schemas.openxmlformats.org/officeDocument/2006/relationships" xmlns:p="http://schemas.openxmlformats.org/presentationml/2006/main">
   <p:cSld>
     <p:spTree>
@@ -9073,7 +8615,7 @@
 </p:sld>
 </file>
 
-<file path=ppt/slides/slide21.xml><?xml version="1.0" encoding="utf-8"?>
+<file path=ppt/slides/slide19.xml><?xml version="1.0" encoding="utf-8"?>
 <p:sld xmlns:a="http://schemas.openxmlformats.org/drawingml/2006/main" xmlns:r="http://schemas.openxmlformats.org/officeDocument/2006/relationships" xmlns:p="http://schemas.openxmlformats.org/presentationml/2006/main">
   <p:cSld>
     <p:spTree>
@@ -9178,7 +8720,21 @@
             </a:r>
             <a:r>
               <a:rPr lang="fr-FR" dirty="0"/>
-              <a:t> du modèle pré-entraîné est utilisée pour prédire la race. La race ayant la plus haute probabilité est proposée.</a:t>
+              <a:t> du modèle pré-entraîné est utilisée pour prédire la race</a:t>
+            </a:r>
+            <a:r>
+              <a:rPr lang="fr-FR"/>
+              <a:t>. </a:t>
+            </a:r>
+          </a:p>
+          <a:p>
+            <a:r>
+              <a:rPr lang="fr-FR"/>
+              <a:t>La </a:t>
+            </a:r>
+            <a:r>
+              <a:rPr lang="fr-FR" dirty="0"/>
+              <a:t>race ayant la plus haute probabilité est proposée.</a:t>
             </a:r>
           </a:p>
         </p:txBody>
@@ -9226,7 +8782,124 @@
 </p:sld>
 </file>
 
-<file path=ppt/slides/slide22.xml><?xml version="1.0" encoding="utf-8"?>
+<file path=ppt/slides/slide2.xml><?xml version="1.0" encoding="utf-8"?>
+<p:sld xmlns:a="http://schemas.openxmlformats.org/drawingml/2006/main" xmlns:r="http://schemas.openxmlformats.org/officeDocument/2006/relationships" xmlns:p="http://schemas.openxmlformats.org/presentationml/2006/main">
+  <p:cSld>
+    <p:spTree>
+      <p:nvGrpSpPr>
+        <p:cNvPr id="1" name=""/>
+        <p:cNvGrpSpPr/>
+        <p:nvPr/>
+      </p:nvGrpSpPr>
+      <p:grpSpPr>
+        <a:xfrm>
+          <a:off x="0" y="0"/>
+          <a:ext cx="0" cy="0"/>
+          <a:chOff x="0" y="0"/>
+          <a:chExt cx="0" cy="0"/>
+        </a:xfrm>
+      </p:grpSpPr>
+      <p:sp>
+        <p:nvSpPr>
+          <p:cNvPr id="4" name="Titre 3">
+            <a:extLst>
+              <a:ext uri="{FF2B5EF4-FFF2-40B4-BE49-F238E27FC236}">
+                <a16:creationId xmlns:a16="http://schemas.microsoft.com/office/drawing/2014/main" id="{94541D3B-25D8-4DAB-B18A-CD876226466A}"/>
+              </a:ext>
+            </a:extLst>
+          </p:cNvPr>
+          <p:cNvSpPr>
+            <a:spLocks noGrp="1"/>
+          </p:cNvSpPr>
+          <p:nvPr>
+            <p:ph type="title"/>
+          </p:nvPr>
+        </p:nvSpPr>
+        <p:spPr/>
+        <p:txBody>
+          <a:bodyPr/>
+          <a:lstStyle/>
+          <a:p>
+            <a:r>
+              <a:rPr lang="fr-FR" dirty="0"/>
+              <a:t>SOMMAIRE</a:t>
+            </a:r>
+          </a:p>
+        </p:txBody>
+      </p:sp>
+      <p:sp>
+        <p:nvSpPr>
+          <p:cNvPr id="5" name="Espace réservé du contenu 4">
+            <a:extLst>
+              <a:ext uri="{FF2B5EF4-FFF2-40B4-BE49-F238E27FC236}">
+                <a16:creationId xmlns:a16="http://schemas.microsoft.com/office/drawing/2014/main" id="{C70A2D34-4EEF-475E-8703-AE6595F75788}"/>
+              </a:ext>
+            </a:extLst>
+          </p:cNvPr>
+          <p:cNvSpPr>
+            <a:spLocks noGrp="1"/>
+          </p:cNvSpPr>
+          <p:nvPr>
+            <p:ph sz="quarter" idx="10"/>
+          </p:nvPr>
+        </p:nvSpPr>
+        <p:spPr>
+          <a:xfrm>
+            <a:off x="200025" y="953037"/>
+            <a:ext cx="11298238" cy="5293217"/>
+          </a:xfrm>
+        </p:spPr>
+        <p:txBody>
+          <a:bodyPr>
+            <a:normAutofit/>
+          </a:bodyPr>
+          <a:lstStyle/>
+          <a:p>
+            <a:r>
+              <a:rPr lang="fr-FR" sz="2400" dirty="0"/>
+              <a:t>Présentation de la démarche</a:t>
+            </a:r>
+          </a:p>
+          <a:p>
+            <a:r>
+              <a:rPr lang="fr-FR" sz="2400" dirty="0"/>
+              <a:t>Analyse et préparation des données</a:t>
+            </a:r>
+          </a:p>
+          <a:p>
+            <a:r>
+              <a:rPr lang="fr-FR" sz="2400" dirty="0"/>
+              <a:t>Méthode SIFT</a:t>
+            </a:r>
+          </a:p>
+          <a:p>
+            <a:r>
+              <a:rPr lang="fr-FR" sz="2400" dirty="0"/>
+              <a:t>Méthode CNN</a:t>
+            </a:r>
+          </a:p>
+          <a:p>
+            <a:r>
+              <a:rPr lang="fr-FR" sz="2400" dirty="0"/>
+              <a:t>Programme de test</a:t>
+            </a:r>
+          </a:p>
+        </p:txBody>
+      </p:sp>
+    </p:spTree>
+    <p:extLst>
+      <p:ext uri="{BB962C8B-B14F-4D97-AF65-F5344CB8AC3E}">
+        <p14:creationId xmlns:p14="http://schemas.microsoft.com/office/powerpoint/2010/main" val="4004448443"/>
+      </p:ext>
+    </p:extLst>
+  </p:cSld>
+  <p:clrMapOvr>
+    <a:masterClrMapping/>
+  </p:clrMapOvr>
+</p:sld>
+</file>
+
+<file path=ppt/slides/slide20.xml><?xml version="1.0" encoding="utf-8"?>
 <p:sld xmlns:a="http://schemas.openxmlformats.org/drawingml/2006/main" xmlns:r="http://schemas.openxmlformats.org/officeDocument/2006/relationships" xmlns:p="http://schemas.openxmlformats.org/presentationml/2006/main">
   <p:cSld>
     <p:spTree>
@@ -10292,120 +9965,6 @@
           <p:cNvPr id="2" name="Titre 1">
             <a:extLst>
               <a:ext uri="{FF2B5EF4-FFF2-40B4-BE49-F238E27FC236}">
-                <a16:creationId xmlns:a16="http://schemas.microsoft.com/office/drawing/2014/main" id="{4E310C1E-1B20-423F-A24F-2724AD51F6D0}"/>
-              </a:ext>
-            </a:extLst>
-          </p:cNvPr>
-          <p:cNvSpPr>
-            <a:spLocks noGrp="1"/>
-          </p:cNvSpPr>
-          <p:nvPr>
-            <p:ph type="title"/>
-          </p:nvPr>
-        </p:nvSpPr>
-        <p:spPr/>
-        <p:txBody>
-          <a:bodyPr/>
-          <a:lstStyle/>
-          <a:p>
-            <a:r>
-              <a:rPr lang="fr-FR" dirty="0"/>
-              <a:t>2. Analyse et préparation des images</a:t>
-            </a:r>
-            <a:br>
-              <a:rPr lang="fr-FR" dirty="0"/>
-            </a:br>
-            <a:r>
-              <a:rPr lang="fr-FR" dirty="0"/>
-              <a:t>Jeux d’entraînement et de test</a:t>
-            </a:r>
-          </a:p>
-        </p:txBody>
-      </p:sp>
-      <p:sp>
-        <p:nvSpPr>
-          <p:cNvPr id="3" name="Espace réservé du contenu 2">
-            <a:extLst>
-              <a:ext uri="{FF2B5EF4-FFF2-40B4-BE49-F238E27FC236}">
-                <a16:creationId xmlns:a16="http://schemas.microsoft.com/office/drawing/2014/main" id="{B63F9BA7-4F84-4F77-8EA5-5369C2EC771F}"/>
-              </a:ext>
-            </a:extLst>
-          </p:cNvPr>
-          <p:cNvSpPr>
-            <a:spLocks noGrp="1"/>
-          </p:cNvSpPr>
-          <p:nvPr>
-            <p:ph idx="1"/>
-          </p:nvPr>
-        </p:nvSpPr>
-        <p:spPr/>
-        <p:txBody>
-          <a:bodyPr/>
-          <a:lstStyle/>
-          <a:p>
-            <a:r>
-              <a:rPr lang="fr-FR" dirty="0"/>
-              <a:t>Pour chaque race de chien nous disposons de 150 à 250 photos</a:t>
-            </a:r>
-          </a:p>
-          <a:p>
-            <a:pPr lvl="1"/>
-            <a:r>
-              <a:rPr lang="fr-FR" dirty="0"/>
-              <a:t>Le jeu d’entrainement est prédéfini et comporte 100 images pour chaque race</a:t>
-            </a:r>
-          </a:p>
-          <a:p>
-            <a:pPr lvl="1"/>
-            <a:r>
-              <a:rPr lang="fr-FR" dirty="0"/>
-              <a:t>Les images restantes constituent le jeu de test</a:t>
-            </a:r>
-          </a:p>
-          <a:p>
-            <a:pPr lvl="1"/>
-            <a:endParaRPr lang="fr-FR" dirty="0"/>
-          </a:p>
-          <a:p>
-            <a:endParaRPr lang="fr-FR" dirty="0"/>
-          </a:p>
-        </p:txBody>
-      </p:sp>
-    </p:spTree>
-    <p:extLst>
-      <p:ext uri="{BB962C8B-B14F-4D97-AF65-F5344CB8AC3E}">
-        <p14:creationId xmlns:p14="http://schemas.microsoft.com/office/powerpoint/2010/main" val="1943555601"/>
-      </p:ext>
-    </p:extLst>
-  </p:cSld>
-  <p:clrMapOvr>
-    <a:masterClrMapping/>
-  </p:clrMapOvr>
-</p:sld>
-</file>
-
-<file path=ppt/slides/slide7.xml><?xml version="1.0" encoding="utf-8"?>
-<p:sld xmlns:a="http://schemas.openxmlformats.org/drawingml/2006/main" xmlns:r="http://schemas.openxmlformats.org/officeDocument/2006/relationships" xmlns:p="http://schemas.openxmlformats.org/presentationml/2006/main">
-  <p:cSld>
-    <p:spTree>
-      <p:nvGrpSpPr>
-        <p:cNvPr id="1" name=""/>
-        <p:cNvGrpSpPr/>
-        <p:nvPr/>
-      </p:nvGrpSpPr>
-      <p:grpSpPr>
-        <a:xfrm>
-          <a:off x="0" y="0"/>
-          <a:ext cx="0" cy="0"/>
-          <a:chOff x="0" y="0"/>
-          <a:chExt cx="0" cy="0"/>
-        </a:xfrm>
-      </p:grpSpPr>
-      <p:sp>
-        <p:nvSpPr>
-          <p:cNvPr id="2" name="Titre 1">
-            <a:extLst>
-              <a:ext uri="{FF2B5EF4-FFF2-40B4-BE49-F238E27FC236}">
                 <a16:creationId xmlns:a16="http://schemas.microsoft.com/office/drawing/2014/main" id="{36CFCD8D-DD1D-43E6-908F-6A737C1C0A51}"/>
               </a:ext>
             </a:extLst>
@@ -10595,109 +10154,7 @@
 </p:sld>
 </file>
 
-<file path=ppt/slides/slide8.xml><?xml version="1.0" encoding="utf-8"?>
-<p:sld xmlns:a="http://schemas.openxmlformats.org/drawingml/2006/main" xmlns:r="http://schemas.openxmlformats.org/officeDocument/2006/relationships" xmlns:p="http://schemas.openxmlformats.org/presentationml/2006/main">
-  <p:cSld>
-    <p:spTree>
-      <p:nvGrpSpPr>
-        <p:cNvPr id="1" name=""/>
-        <p:cNvGrpSpPr/>
-        <p:nvPr/>
-      </p:nvGrpSpPr>
-      <p:grpSpPr>
-        <a:xfrm>
-          <a:off x="0" y="0"/>
-          <a:ext cx="0" cy="0"/>
-          <a:chOff x="0" y="0"/>
-          <a:chExt cx="0" cy="0"/>
-        </a:xfrm>
-      </p:grpSpPr>
-      <p:sp>
-        <p:nvSpPr>
-          <p:cNvPr id="2" name="Titre 1">
-            <a:extLst>
-              <a:ext uri="{FF2B5EF4-FFF2-40B4-BE49-F238E27FC236}">
-                <a16:creationId xmlns:a16="http://schemas.microsoft.com/office/drawing/2014/main" id="{36CFCD8D-DD1D-43E6-908F-6A737C1C0A51}"/>
-              </a:ext>
-            </a:extLst>
-          </p:cNvPr>
-          <p:cNvSpPr>
-            <a:spLocks noGrp="1"/>
-          </p:cNvSpPr>
-          <p:nvPr>
-            <p:ph type="title"/>
-          </p:nvPr>
-        </p:nvSpPr>
-        <p:spPr/>
-        <p:txBody>
-          <a:bodyPr/>
-          <a:lstStyle/>
-          <a:p>
-            <a:r>
-              <a:rPr lang="fr-FR" dirty="0"/>
-              <a:t>5. Algorithme SIFT</a:t>
-            </a:r>
-            <a:br>
-              <a:rPr lang="fr-FR" dirty="0"/>
-            </a:br>
-            <a:r>
-              <a:rPr lang="fr-FR" dirty="0"/>
-              <a:t>Extraction des descripteurs et clustering</a:t>
-            </a:r>
-          </a:p>
-        </p:txBody>
-      </p:sp>
-      <p:sp>
-        <p:nvSpPr>
-          <p:cNvPr id="3" name="Espace réservé du contenu 2">
-            <a:extLst>
-              <a:ext uri="{FF2B5EF4-FFF2-40B4-BE49-F238E27FC236}">
-                <a16:creationId xmlns:a16="http://schemas.microsoft.com/office/drawing/2014/main" id="{48BDE116-C35A-4DE3-82E3-3B0B01FB21B5}"/>
-              </a:ext>
-            </a:extLst>
-          </p:cNvPr>
-          <p:cNvSpPr>
-            <a:spLocks noGrp="1"/>
-          </p:cNvSpPr>
-          <p:nvPr>
-            <p:ph idx="1"/>
-          </p:nvPr>
-        </p:nvSpPr>
-        <p:spPr/>
-        <p:txBody>
-          <a:bodyPr/>
-          <a:lstStyle/>
-          <a:p>
-            <a:r>
-              <a:rPr lang="fr-FR" dirty="0"/>
-              <a:t>Histogrammes</a:t>
-            </a:r>
-          </a:p>
-          <a:p>
-            <a:endParaRPr lang="fr-FR" dirty="0"/>
-          </a:p>
-          <a:p>
-            <a:endParaRPr lang="fr-FR" dirty="0"/>
-          </a:p>
-          <a:p>
-            <a:endParaRPr lang="fr-FR" dirty="0"/>
-          </a:p>
-        </p:txBody>
-      </p:sp>
-    </p:spTree>
-    <p:extLst>
-      <p:ext uri="{BB962C8B-B14F-4D97-AF65-F5344CB8AC3E}">
-        <p14:creationId xmlns:p14="http://schemas.microsoft.com/office/powerpoint/2010/main" val="21265472"/>
-      </p:ext>
-    </p:extLst>
-  </p:cSld>
-  <p:clrMapOvr>
-    <a:masterClrMapping/>
-  </p:clrMapOvr>
-</p:sld>
-</file>
-
-<file path=ppt/slides/slide9.xml><?xml version="1.0" encoding="utf-8"?>
+<file path=ppt/slides/slide7.xml><?xml version="1.0" encoding="utf-8"?>
 <p:sld xmlns:a="http://schemas.openxmlformats.org/drawingml/2006/main" xmlns:r="http://schemas.openxmlformats.org/officeDocument/2006/relationships" xmlns:p="http://schemas.openxmlformats.org/presentationml/2006/main">
   <p:cSld>
     <p:spTree>
@@ -10881,6 +10338,307 @@
     <p:extLst>
       <p:ext uri="{BB962C8B-B14F-4D97-AF65-F5344CB8AC3E}">
         <p14:creationId xmlns:p14="http://schemas.microsoft.com/office/powerpoint/2010/main" val="710674228"/>
+      </p:ext>
+    </p:extLst>
+  </p:cSld>
+  <p:clrMapOvr>
+    <a:masterClrMapping/>
+  </p:clrMapOvr>
+</p:sld>
+</file>
+
+<file path=ppt/slides/slide8.xml><?xml version="1.0" encoding="utf-8"?>
+<p:sld xmlns:a="http://schemas.openxmlformats.org/drawingml/2006/main" xmlns:r="http://schemas.openxmlformats.org/officeDocument/2006/relationships" xmlns:p="http://schemas.openxmlformats.org/presentationml/2006/main">
+  <p:cSld>
+    <p:spTree>
+      <p:nvGrpSpPr>
+        <p:cNvPr id="1" name=""/>
+        <p:cNvGrpSpPr/>
+        <p:nvPr/>
+      </p:nvGrpSpPr>
+      <p:grpSpPr>
+        <a:xfrm>
+          <a:off x="0" y="0"/>
+          <a:ext cx="0" cy="0"/>
+          <a:chOff x="0" y="0"/>
+          <a:chExt cx="0" cy="0"/>
+        </a:xfrm>
+      </p:grpSpPr>
+      <p:sp>
+        <p:nvSpPr>
+          <p:cNvPr id="2" name="Titre 1">
+            <a:extLst>
+              <a:ext uri="{FF2B5EF4-FFF2-40B4-BE49-F238E27FC236}">
+                <a16:creationId xmlns:a16="http://schemas.microsoft.com/office/drawing/2014/main" id="{36CFCD8D-DD1D-43E6-908F-6A737C1C0A51}"/>
+              </a:ext>
+            </a:extLst>
+          </p:cNvPr>
+          <p:cNvSpPr>
+            <a:spLocks noGrp="1"/>
+          </p:cNvSpPr>
+          <p:nvPr>
+            <p:ph type="title"/>
+          </p:nvPr>
+        </p:nvSpPr>
+        <p:spPr/>
+        <p:txBody>
+          <a:bodyPr/>
+          <a:lstStyle/>
+          <a:p>
+            <a:r>
+              <a:rPr lang="fr-FR" dirty="0"/>
+              <a:t>5. Algorithme SIFT</a:t>
+            </a:r>
+            <a:br>
+              <a:rPr lang="fr-FR" dirty="0"/>
+            </a:br>
+            <a:r>
+              <a:rPr lang="fr-FR" dirty="0"/>
+              <a:t>Distribution des histogrammes</a:t>
+            </a:r>
+          </a:p>
+        </p:txBody>
+      </p:sp>
+      <p:sp>
+        <p:nvSpPr>
+          <p:cNvPr id="3" name="Espace réservé du contenu 2">
+            <a:extLst>
+              <a:ext uri="{FF2B5EF4-FFF2-40B4-BE49-F238E27FC236}">
+                <a16:creationId xmlns:a16="http://schemas.microsoft.com/office/drawing/2014/main" id="{48BDE116-C35A-4DE3-82E3-3B0B01FB21B5}"/>
+              </a:ext>
+            </a:extLst>
+          </p:cNvPr>
+          <p:cNvSpPr>
+            <a:spLocks noGrp="1"/>
+          </p:cNvSpPr>
+          <p:nvPr>
+            <p:ph idx="1"/>
+          </p:nvPr>
+        </p:nvSpPr>
+        <p:spPr/>
+        <p:txBody>
+          <a:bodyPr/>
+          <a:lstStyle/>
+          <a:p>
+            <a:r>
+              <a:rPr lang="fr-FR" dirty="0"/>
+              <a:t>Représentation t-SNE des histogrammes de 3 races de chiens (300 images)</a:t>
+            </a:r>
+          </a:p>
+          <a:p>
+            <a:endParaRPr lang="fr-FR" dirty="0"/>
+          </a:p>
+          <a:p>
+            <a:endParaRPr lang="fr-FR" dirty="0"/>
+          </a:p>
+        </p:txBody>
+      </p:sp>
+      <p:pic>
+        <p:nvPicPr>
+          <p:cNvPr id="9" name="Image 8">
+            <a:extLst>
+              <a:ext uri="{FF2B5EF4-FFF2-40B4-BE49-F238E27FC236}">
+                <a16:creationId xmlns:a16="http://schemas.microsoft.com/office/drawing/2014/main" id="{A335F372-B6A2-495D-8442-6A0E05430D51}"/>
+              </a:ext>
+            </a:extLst>
+          </p:cNvPr>
+          <p:cNvPicPr>
+            <a:picLocks noChangeAspect="1"/>
+          </p:cNvPicPr>
+          <p:nvPr/>
+        </p:nvPicPr>
+        <p:blipFill>
+          <a:blip r:embed="rId2">
+            <a:extLst>
+              <a:ext uri="{28A0092B-C50C-407E-A947-70E740481C1C}">
+                <a14:useLocalDpi xmlns:a14="http://schemas.microsoft.com/office/drawing/2010/main" val="0"/>
+              </a:ext>
+            </a:extLst>
+          </a:blip>
+          <a:stretch>
+            <a:fillRect/>
+          </a:stretch>
+        </p:blipFill>
+        <p:spPr>
+          <a:xfrm>
+            <a:off x="3763078" y="1840331"/>
+            <a:ext cx="4361044" cy="4295954"/>
+          </a:xfrm>
+          <a:prstGeom prst="rect">
+            <a:avLst/>
+          </a:prstGeom>
+        </p:spPr>
+      </p:pic>
+    </p:spTree>
+    <p:extLst>
+      <p:ext uri="{BB962C8B-B14F-4D97-AF65-F5344CB8AC3E}">
+        <p14:creationId xmlns:p14="http://schemas.microsoft.com/office/powerpoint/2010/main" val="2572900103"/>
+      </p:ext>
+    </p:extLst>
+  </p:cSld>
+  <p:clrMapOvr>
+    <a:masterClrMapping/>
+  </p:clrMapOvr>
+</p:sld>
+</file>
+
+<file path=ppt/slides/slide9.xml><?xml version="1.0" encoding="utf-8"?>
+<p:sld xmlns:a="http://schemas.openxmlformats.org/drawingml/2006/main" xmlns:r="http://schemas.openxmlformats.org/officeDocument/2006/relationships" xmlns:p="http://schemas.openxmlformats.org/presentationml/2006/main">
+  <p:cSld>
+    <p:spTree>
+      <p:nvGrpSpPr>
+        <p:cNvPr id="1" name=""/>
+        <p:cNvGrpSpPr/>
+        <p:nvPr/>
+      </p:nvGrpSpPr>
+      <p:grpSpPr>
+        <a:xfrm>
+          <a:off x="0" y="0"/>
+          <a:ext cx="0" cy="0"/>
+          <a:chOff x="0" y="0"/>
+          <a:chExt cx="0" cy="0"/>
+        </a:xfrm>
+      </p:grpSpPr>
+      <p:sp>
+        <p:nvSpPr>
+          <p:cNvPr id="2" name="Titre 1">
+            <a:extLst>
+              <a:ext uri="{FF2B5EF4-FFF2-40B4-BE49-F238E27FC236}">
+                <a16:creationId xmlns:a16="http://schemas.microsoft.com/office/drawing/2014/main" id="{36CFCD8D-DD1D-43E6-908F-6A737C1C0A51}"/>
+              </a:ext>
+            </a:extLst>
+          </p:cNvPr>
+          <p:cNvSpPr>
+            <a:spLocks noGrp="1"/>
+          </p:cNvSpPr>
+          <p:nvPr>
+            <p:ph type="title"/>
+          </p:nvPr>
+        </p:nvSpPr>
+        <p:spPr/>
+        <p:txBody>
+          <a:bodyPr/>
+          <a:lstStyle/>
+          <a:p>
+            <a:r>
+              <a:rPr lang="fr-FR" dirty="0"/>
+              <a:t>5. Algorithme SIFT</a:t>
+            </a:r>
+            <a:br>
+              <a:rPr lang="fr-FR" dirty="0"/>
+            </a:br>
+            <a:r>
+              <a:rPr lang="fr-FR" dirty="0"/>
+              <a:t>Clustering supervisé</a:t>
+            </a:r>
+          </a:p>
+        </p:txBody>
+      </p:sp>
+      <p:sp>
+        <p:nvSpPr>
+          <p:cNvPr id="3" name="Espace réservé du contenu 2">
+            <a:extLst>
+              <a:ext uri="{FF2B5EF4-FFF2-40B4-BE49-F238E27FC236}">
+                <a16:creationId xmlns:a16="http://schemas.microsoft.com/office/drawing/2014/main" id="{48BDE116-C35A-4DE3-82E3-3B0B01FB21B5}"/>
+              </a:ext>
+            </a:extLst>
+          </p:cNvPr>
+          <p:cNvSpPr>
+            <a:spLocks noGrp="1"/>
+          </p:cNvSpPr>
+          <p:nvPr>
+            <p:ph idx="1"/>
+          </p:nvPr>
+        </p:nvSpPr>
+        <p:spPr/>
+        <p:txBody>
+          <a:bodyPr/>
+          <a:lstStyle/>
+          <a:p>
+            <a:r>
+              <a:rPr lang="fr-FR" dirty="0"/>
+              <a:t>Un algorithme de clustering supervisé est entrainé sur les histogrammes de chaque image. Il sert ensuite à classifier les nouvelles images, et l’</a:t>
+            </a:r>
+            <a:r>
+              <a:rPr lang="fr-FR" dirty="0" err="1"/>
+              <a:t>accuracy</a:t>
+            </a:r>
+            <a:r>
+              <a:rPr lang="fr-FR" dirty="0"/>
+              <a:t> score est calculé.</a:t>
+            </a:r>
+          </a:p>
+          <a:p>
+            <a:pPr lvl="1"/>
+            <a:r>
+              <a:rPr lang="fr-FR" dirty="0"/>
+              <a:t>L’algorithme </a:t>
+            </a:r>
+            <a:r>
+              <a:rPr lang="fr-FR" dirty="0" err="1"/>
+              <a:t>sklearn.linear_model.RidgeClassifier</a:t>
+            </a:r>
+            <a:r>
+              <a:rPr lang="fr-FR" dirty="0"/>
+              <a:t> est utilisé.</a:t>
+            </a:r>
+          </a:p>
+          <a:p>
+            <a:r>
+              <a:rPr lang="fr-FR" dirty="0"/>
+              <a:t>Résultats typiques obtenus :</a:t>
+            </a:r>
+          </a:p>
+          <a:p>
+            <a:pPr lvl="1"/>
+            <a:r>
+              <a:rPr lang="fr-FR" dirty="0"/>
+              <a:t>2 races : 40 à 95% (détails en slide suivant)</a:t>
+            </a:r>
+          </a:p>
+          <a:p>
+            <a:pPr lvl="1"/>
+            <a:r>
+              <a:rPr lang="fr-FR" dirty="0"/>
+              <a:t>10 races : 26%</a:t>
+            </a:r>
+          </a:p>
+          <a:p>
+            <a:pPr lvl="1"/>
+            <a:r>
+              <a:rPr lang="fr-FR" dirty="0"/>
+              <a:t>30 races : 15%</a:t>
+            </a:r>
+          </a:p>
+          <a:p>
+            <a:pPr lvl="1"/>
+            <a:r>
+              <a:rPr lang="fr-FR" dirty="0"/>
+              <a:t>50 races : 10%</a:t>
+            </a:r>
+          </a:p>
+          <a:p>
+            <a:pPr lvl="1"/>
+            <a:endParaRPr lang="fr-FR" dirty="0"/>
+          </a:p>
+          <a:p>
+            <a:endParaRPr lang="fr-FR" dirty="0"/>
+          </a:p>
+          <a:p>
+            <a:endParaRPr lang="fr-FR" dirty="0"/>
+          </a:p>
+          <a:p>
+            <a:endParaRPr lang="fr-FR" dirty="0"/>
+          </a:p>
+          <a:p>
+            <a:endParaRPr lang="fr-FR" dirty="0"/>
+          </a:p>
+        </p:txBody>
+      </p:sp>
+    </p:spTree>
+    <p:extLst>
+      <p:ext uri="{BB962C8B-B14F-4D97-AF65-F5344CB8AC3E}">
+        <p14:creationId xmlns:p14="http://schemas.microsoft.com/office/powerpoint/2010/main" val="1250577055"/>
       </p:ext>
     </p:extLst>
   </p:cSld>
@@ -12058,15 +11816,6 @@
 </file>
 
 <file path=customXml/item1.xml><?xml version="1.0" encoding="utf-8"?>
-<?mso-contentType ?>
-<FormTemplates xmlns="http://schemas.microsoft.com/sharepoint/v3/contenttype/forms">
-  <Display>DocumentLibraryForm</Display>
-  <Edit>DocumentLibraryForm</Edit>
-  <New>DocumentLibraryForm</New>
-</FormTemplates>
-</file>
-
-<file path=customXml/item2.xml><?xml version="1.0" encoding="utf-8"?>
 <ct:contentTypeSchema xmlns:ct="http://schemas.microsoft.com/office/2006/metadata/contentType" xmlns:ma="http://schemas.microsoft.com/office/2006/metadata/properties/metaAttributes" ct:_="" ma:_="" ma:contentTypeName="Document" ma:contentTypeID="0x010100A537AE1B38F5374CB91791C8A0C9479B" ma:contentTypeVersion="4" ma:contentTypeDescription="Create a new document." ma:contentTypeScope="" ma:versionID="ddabe59c32190856211847cb9c33ea86">
   <xsd:schema xmlns:xsd="http://www.w3.org/2001/XMLSchema" xmlns:xs="http://www.w3.org/2001/XMLSchema" xmlns:p="http://schemas.microsoft.com/office/2006/metadata/properties" xmlns:ns2="242081e3-def4-49db-957a-142271ec8b9e" xmlns:ns3="748099ad-2d26-4e61-9061-59d3c097668b" targetNamespace="http://schemas.microsoft.com/office/2006/metadata/properties" ma:root="true" ma:fieldsID="025dae5700d7a7b1a3520b565702b9c9" ns2:_="" ns3:_="">
     <xsd:import namespace="242081e3-def4-49db-957a-142271ec8b9e"/>
@@ -12231,6 +11980,15 @@
 </ct:contentTypeSchema>
 </file>
 
+<file path=customXml/item2.xml><?xml version="1.0" encoding="utf-8"?>
+<?mso-contentType ?>
+<FormTemplates xmlns="http://schemas.microsoft.com/sharepoint/v3/contenttype/forms">
+  <Display>DocumentLibraryForm</Display>
+  <Edit>DocumentLibraryForm</Edit>
+  <New>DocumentLibraryForm</New>
+</FormTemplates>
+</file>
+
 <file path=customXml/item3.xml><?xml version="1.0" encoding="utf-8"?>
 <p:properties xmlns:p="http://schemas.microsoft.com/office/2006/metadata/properties" xmlns:xsi="http://www.w3.org/2001/XMLSchema-instance" xmlns:pc="http://schemas.microsoft.com/office/infopath/2007/PartnerControls">
   <documentManagement>
@@ -12246,14 +12004,6 @@
 </file>
 
 <file path=customXml/itemProps1.xml><?xml version="1.0" encoding="utf-8"?>
-<ds:datastoreItem xmlns:ds="http://schemas.openxmlformats.org/officeDocument/2006/customXml" ds:itemID="{39C1D1BA-6728-4495-AD47-2EC15D871705}">
-  <ds:schemaRefs>
-    <ds:schemaRef ds:uri="http://schemas.microsoft.com/sharepoint/v3/contenttype/forms"/>
-  </ds:schemaRefs>
-</ds:datastoreItem>
-</file>
-
-<file path=customXml/itemProps2.xml><?xml version="1.0" encoding="utf-8"?>
 <ds:datastoreItem xmlns:ds="http://schemas.openxmlformats.org/officeDocument/2006/customXml" ds:itemID="{B6B810FD-868A-4154-A451-4A43B5BD2BCF}">
   <ds:schemaRefs>
     <ds:schemaRef ds:uri="http://schemas.microsoft.com/office/2006/metadata/contentType"/>
@@ -12272,19 +12022,27 @@
 </ds:datastoreItem>
 </file>
 
+<file path=customXml/itemProps2.xml><?xml version="1.0" encoding="utf-8"?>
+<ds:datastoreItem xmlns:ds="http://schemas.openxmlformats.org/officeDocument/2006/customXml" ds:itemID="{39C1D1BA-6728-4495-AD47-2EC15D871705}">
+  <ds:schemaRefs>
+    <ds:schemaRef ds:uri="http://schemas.microsoft.com/sharepoint/v3/contenttype/forms"/>
+  </ds:schemaRefs>
+</ds:datastoreItem>
+</file>
+
 <file path=customXml/itemProps3.xml><?xml version="1.0" encoding="utf-8"?>
 <ds:datastoreItem xmlns:ds="http://schemas.openxmlformats.org/officeDocument/2006/customXml" ds:itemID="{2E0D8ABF-D62B-43C1-8CD5-8FDE6B705449}">
   <ds:schemaRefs>
     <ds:schemaRef ds:uri="242081e3-def4-49db-957a-142271ec8b9e"/>
-    <ds:schemaRef ds:uri="http://purl.org/dc/dcmitype/"/>
-    <ds:schemaRef ds:uri="http://purl.org/dc/elements/1.1/"/>
-    <ds:schemaRef ds:uri="http://www.w3.org/XML/1998/namespace"/>
-    <ds:schemaRef ds:uri="748099ad-2d26-4e61-9061-59d3c097668b"/>
     <ds:schemaRef ds:uri="http://purl.org/dc/terms/"/>
     <ds:schemaRef ds:uri="http://schemas.openxmlformats.org/package/2006/metadata/core-properties"/>
+    <ds:schemaRef ds:uri="748099ad-2d26-4e61-9061-59d3c097668b"/>
     <ds:schemaRef ds:uri="http://schemas.microsoft.com/office/2006/documentManagement/types"/>
     <ds:schemaRef ds:uri="http://schemas.microsoft.com/office/infopath/2007/PartnerControls"/>
+    <ds:schemaRef ds:uri="http://purl.org/dc/elements/1.1/"/>
     <ds:schemaRef ds:uri="http://schemas.microsoft.com/office/2006/metadata/properties"/>
+    <ds:schemaRef ds:uri="http://www.w3.org/XML/1998/namespace"/>
+    <ds:schemaRef ds:uri="http://purl.org/dc/dcmitype/"/>
   </ds:schemaRefs>
 </ds:datastoreItem>
 </file>

</xml_diff>

<commit_message>
Run 10 races VGG16
</commit_message>
<xml_diff>
--- a/docs/Projet 7 - C. Muths - Classification d'images.pptx
+++ b/docs/Projet 7 - C. Muths - Classification d'images.pptx
@@ -6416,7 +6416,7 @@
             <p:ph idx="1"/>
             <p:extLst>
               <p:ext uri="{D42A27DB-BD31-4B8C-83A1-F6EECF244321}">
-                <p14:modId xmlns:p14="http://schemas.microsoft.com/office/powerpoint/2010/main" val="4120060123"/>
+                <p14:modId xmlns:p14="http://schemas.microsoft.com/office/powerpoint/2010/main" val="2021446011"/>
               </p:ext>
             </p:extLst>
           </p:nvPr>
@@ -6636,7 +6636,7 @@
                     <a:p>
                       <a:r>
                         <a:rPr lang="fr-FR" dirty="0"/>
-                        <a:t>(fit time </a:t>
+                        <a:t>69,9% (fit time 71mn)</a:t>
                       </a:r>
                     </a:p>
                   </a:txBody>
@@ -11816,6 +11816,15 @@
 </file>
 
 <file path=customXml/item1.xml><?xml version="1.0" encoding="utf-8"?>
+<?mso-contentType ?>
+<FormTemplates xmlns="http://schemas.microsoft.com/sharepoint/v3/contenttype/forms">
+  <Display>DocumentLibraryForm</Display>
+  <Edit>DocumentLibraryForm</Edit>
+  <New>DocumentLibraryForm</New>
+</FormTemplates>
+</file>
+
+<file path=customXml/item2.xml><?xml version="1.0" encoding="utf-8"?>
 <ct:contentTypeSchema xmlns:ct="http://schemas.microsoft.com/office/2006/metadata/contentType" xmlns:ma="http://schemas.microsoft.com/office/2006/metadata/properties/metaAttributes" ct:_="" ma:_="" ma:contentTypeName="Document" ma:contentTypeID="0x010100A537AE1B38F5374CB91791C8A0C9479B" ma:contentTypeVersion="4" ma:contentTypeDescription="Create a new document." ma:contentTypeScope="" ma:versionID="ddabe59c32190856211847cb9c33ea86">
   <xsd:schema xmlns:xsd="http://www.w3.org/2001/XMLSchema" xmlns:xs="http://www.w3.org/2001/XMLSchema" xmlns:p="http://schemas.microsoft.com/office/2006/metadata/properties" xmlns:ns2="242081e3-def4-49db-957a-142271ec8b9e" xmlns:ns3="748099ad-2d26-4e61-9061-59d3c097668b" targetNamespace="http://schemas.microsoft.com/office/2006/metadata/properties" ma:root="true" ma:fieldsID="025dae5700d7a7b1a3520b565702b9c9" ns2:_="" ns3:_="">
     <xsd:import namespace="242081e3-def4-49db-957a-142271ec8b9e"/>
@@ -11980,15 +11989,6 @@
 </ct:contentTypeSchema>
 </file>
 
-<file path=customXml/item2.xml><?xml version="1.0" encoding="utf-8"?>
-<?mso-contentType ?>
-<FormTemplates xmlns="http://schemas.microsoft.com/sharepoint/v3/contenttype/forms">
-  <Display>DocumentLibraryForm</Display>
-  <Edit>DocumentLibraryForm</Edit>
-  <New>DocumentLibraryForm</New>
-</FormTemplates>
-</file>
-
 <file path=customXml/item3.xml><?xml version="1.0" encoding="utf-8"?>
 <p:properties xmlns:p="http://schemas.microsoft.com/office/2006/metadata/properties" xmlns:xsi="http://www.w3.org/2001/XMLSchema-instance" xmlns:pc="http://schemas.microsoft.com/office/infopath/2007/PartnerControls">
   <documentManagement>
@@ -12004,6 +12004,14 @@
 </file>
 
 <file path=customXml/itemProps1.xml><?xml version="1.0" encoding="utf-8"?>
+<ds:datastoreItem xmlns:ds="http://schemas.openxmlformats.org/officeDocument/2006/customXml" ds:itemID="{39C1D1BA-6728-4495-AD47-2EC15D871705}">
+  <ds:schemaRefs>
+    <ds:schemaRef ds:uri="http://schemas.microsoft.com/sharepoint/v3/contenttype/forms"/>
+  </ds:schemaRefs>
+</ds:datastoreItem>
+</file>
+
+<file path=customXml/itemProps2.xml><?xml version="1.0" encoding="utf-8"?>
 <ds:datastoreItem xmlns:ds="http://schemas.openxmlformats.org/officeDocument/2006/customXml" ds:itemID="{B6B810FD-868A-4154-A451-4A43B5BD2BCF}">
   <ds:schemaRefs>
     <ds:schemaRef ds:uri="http://schemas.microsoft.com/office/2006/metadata/contentType"/>
@@ -12018,14 +12026,6 @@
     <ds:schemaRef ds:uri="http://purl.org/dc/elements/1.1/"/>
     <ds:schemaRef ds:uri="http://purl.org/dc/terms/"/>
     <ds:schemaRef ds:uri="http://schemas.microsoft.com/internal/obd"/>
-  </ds:schemaRefs>
-</ds:datastoreItem>
-</file>
-
-<file path=customXml/itemProps2.xml><?xml version="1.0" encoding="utf-8"?>
-<ds:datastoreItem xmlns:ds="http://schemas.openxmlformats.org/officeDocument/2006/customXml" ds:itemID="{39C1D1BA-6728-4495-AD47-2EC15D871705}">
-  <ds:schemaRefs>
-    <ds:schemaRef ds:uri="http://schemas.microsoft.com/sharepoint/v3/contenttype/forms"/>
   </ds:schemaRefs>
 </ds:datastoreItem>
 </file>

</xml_diff>